<commit_message>
Added slides with Insight screenshots
</commit_message>
<xml_diff>
--- a/ofmw-forum2016-insight-valencia-demo.pptx
+++ b/ofmw-forum2016-insight-valencia-demo.pptx
@@ -6,7 +6,10 @@
   </p:sldMasterIdLst>
   <p:sldIdLst>
     <p:sldId id="257" r:id="rId2"/>
-    <p:sldId id="258" r:id="rId3"/>
+    <p:sldId id="259" r:id="rId3"/>
+    <p:sldId id="260" r:id="rId4"/>
+    <p:sldId id="261" r:id="rId5"/>
+    <p:sldId id="258" r:id="rId6"/>
   </p:sldIdLst>
   <p:sldSz cx="9144000" cy="6858000" type="screen4x3"/>
   <p:notesSz cx="6858000" cy="9144000"/>
@@ -4255,6 +4258,258 @@
 </file>
 
 <file path=ppt/slides/slide2.xml><?xml version="1.0" encoding="utf-8"?>
+<p:sld xmlns:a="http://schemas.openxmlformats.org/drawingml/2006/main" xmlns:r="http://schemas.openxmlformats.org/officeDocument/2006/relationships" xmlns:p="http://schemas.openxmlformats.org/presentationml/2006/main">
+  <p:cSld>
+    <p:spTree>
+      <p:nvGrpSpPr>
+        <p:cNvPr id="1" name=""/>
+        <p:cNvGrpSpPr/>
+        <p:nvPr/>
+      </p:nvGrpSpPr>
+      <p:grpSpPr>
+        <a:xfrm>
+          <a:off x="0" y="0"/>
+          <a:ext cx="0" cy="0"/>
+          <a:chOff x="0" y="0"/>
+          <a:chExt cx="0" cy="0"/>
+        </a:xfrm>
+      </p:grpSpPr>
+      <p:pic>
+        <p:nvPicPr>
+          <p:cNvPr id="1026" name="Picture 2"/>
+          <p:cNvPicPr>
+            <a:picLocks noChangeAspect="1" noChangeArrowheads="1"/>
+          </p:cNvPicPr>
+          <p:nvPr/>
+        </p:nvPicPr>
+        <p:blipFill>
+          <a:blip r:embed="rId2">
+            <a:extLst>
+              <a:ext uri="{28A0092B-C50C-407E-A947-70E740481C1C}">
+                <a14:useLocalDpi xmlns:a14="http://schemas.microsoft.com/office/drawing/2010/main" val="0"/>
+              </a:ext>
+            </a:extLst>
+          </a:blip>
+          <a:srcRect/>
+          <a:stretch>
+            <a:fillRect/>
+          </a:stretch>
+        </p:blipFill>
+        <p:spPr bwMode="auto">
+          <a:xfrm>
+            <a:off x="660400" y="536575"/>
+            <a:ext cx="7823200" cy="5784850"/>
+          </a:xfrm>
+          <a:prstGeom prst="rect">
+            <a:avLst/>
+          </a:prstGeom>
+          <a:noFill/>
+          <a:ln>
+            <a:noFill/>
+          </a:ln>
+          <a:extLst>
+            <a:ext uri="{909E8E84-426E-40DD-AFC4-6F175D3DCCD1}">
+              <a14:hiddenFill xmlns:a14="http://schemas.microsoft.com/office/drawing/2010/main">
+                <a:solidFill>
+                  <a:schemeClr val="accent1"/>
+                </a:solidFill>
+              </a14:hiddenFill>
+            </a:ext>
+            <a:ext uri="{91240B29-F687-4F45-9708-019B960494DF}">
+              <a14:hiddenLine xmlns:a14="http://schemas.microsoft.com/office/drawing/2010/main" w="9525">
+                <a:solidFill>
+                  <a:schemeClr val="tx1"/>
+                </a:solidFill>
+                <a:miter lim="800000"/>
+                <a:headEnd/>
+                <a:tailEnd/>
+              </a14:hiddenLine>
+            </a:ext>
+          </a:extLst>
+        </p:spPr>
+      </p:pic>
+    </p:spTree>
+    <p:extLst>
+      <p:ext uri="{BB962C8B-B14F-4D97-AF65-F5344CB8AC3E}">
+        <p14:creationId xmlns:p14="http://schemas.microsoft.com/office/powerpoint/2010/main" val="1985046005"/>
+      </p:ext>
+    </p:extLst>
+  </p:cSld>
+  <p:clrMapOvr>
+    <a:masterClrMapping/>
+  </p:clrMapOvr>
+</p:sld>
+</file>
+
+<file path=ppt/slides/slide3.xml><?xml version="1.0" encoding="utf-8"?>
+<p:sld xmlns:a="http://schemas.openxmlformats.org/drawingml/2006/main" xmlns:r="http://schemas.openxmlformats.org/officeDocument/2006/relationships" xmlns:p="http://schemas.openxmlformats.org/presentationml/2006/main">
+  <p:cSld>
+    <p:spTree>
+      <p:nvGrpSpPr>
+        <p:cNvPr id="1" name=""/>
+        <p:cNvGrpSpPr/>
+        <p:nvPr/>
+      </p:nvGrpSpPr>
+      <p:grpSpPr>
+        <a:xfrm>
+          <a:off x="0" y="0"/>
+          <a:ext cx="0" cy="0"/>
+          <a:chOff x="0" y="0"/>
+          <a:chExt cx="0" cy="0"/>
+        </a:xfrm>
+      </p:grpSpPr>
+      <p:pic>
+        <p:nvPicPr>
+          <p:cNvPr id="2050" name="Picture 2"/>
+          <p:cNvPicPr>
+            <a:picLocks noChangeAspect="1" noChangeArrowheads="1"/>
+          </p:cNvPicPr>
+          <p:nvPr/>
+        </p:nvPicPr>
+        <p:blipFill>
+          <a:blip r:embed="rId2">
+            <a:extLst>
+              <a:ext uri="{28A0092B-C50C-407E-A947-70E740481C1C}">
+                <a14:useLocalDpi xmlns:a14="http://schemas.microsoft.com/office/drawing/2010/main" val="0"/>
+              </a:ext>
+            </a:extLst>
+          </a:blip>
+          <a:srcRect/>
+          <a:stretch>
+            <a:fillRect/>
+          </a:stretch>
+        </p:blipFill>
+        <p:spPr bwMode="auto">
+          <a:xfrm>
+            <a:off x="765175" y="571500"/>
+            <a:ext cx="7613650" cy="5715000"/>
+          </a:xfrm>
+          <a:prstGeom prst="rect">
+            <a:avLst/>
+          </a:prstGeom>
+          <a:noFill/>
+          <a:ln>
+            <a:noFill/>
+          </a:ln>
+          <a:extLst>
+            <a:ext uri="{909E8E84-426E-40DD-AFC4-6F175D3DCCD1}">
+              <a14:hiddenFill xmlns:a14="http://schemas.microsoft.com/office/drawing/2010/main">
+                <a:solidFill>
+                  <a:schemeClr val="accent1"/>
+                </a:solidFill>
+              </a14:hiddenFill>
+            </a:ext>
+            <a:ext uri="{91240B29-F687-4F45-9708-019B960494DF}">
+              <a14:hiddenLine xmlns:a14="http://schemas.microsoft.com/office/drawing/2010/main" w="9525">
+                <a:solidFill>
+                  <a:schemeClr val="tx1"/>
+                </a:solidFill>
+                <a:miter lim="800000"/>
+                <a:headEnd/>
+                <a:tailEnd/>
+              </a14:hiddenLine>
+            </a:ext>
+          </a:extLst>
+        </p:spPr>
+      </p:pic>
+    </p:spTree>
+    <p:extLst>
+      <p:ext uri="{BB962C8B-B14F-4D97-AF65-F5344CB8AC3E}">
+        <p14:creationId xmlns:p14="http://schemas.microsoft.com/office/powerpoint/2010/main" val="1905529038"/>
+      </p:ext>
+    </p:extLst>
+  </p:cSld>
+  <p:clrMapOvr>
+    <a:masterClrMapping/>
+  </p:clrMapOvr>
+</p:sld>
+</file>
+
+<file path=ppt/slides/slide4.xml><?xml version="1.0" encoding="utf-8"?>
+<p:sld xmlns:a="http://schemas.openxmlformats.org/drawingml/2006/main" xmlns:r="http://schemas.openxmlformats.org/officeDocument/2006/relationships" xmlns:p="http://schemas.openxmlformats.org/presentationml/2006/main">
+  <p:cSld>
+    <p:spTree>
+      <p:nvGrpSpPr>
+        <p:cNvPr id="1" name=""/>
+        <p:cNvGrpSpPr/>
+        <p:nvPr/>
+      </p:nvGrpSpPr>
+      <p:grpSpPr>
+        <a:xfrm>
+          <a:off x="0" y="0"/>
+          <a:ext cx="0" cy="0"/>
+          <a:chOff x="0" y="0"/>
+          <a:chExt cx="0" cy="0"/>
+        </a:xfrm>
+      </p:grpSpPr>
+      <p:pic>
+        <p:nvPicPr>
+          <p:cNvPr id="3074" name="Picture 2"/>
+          <p:cNvPicPr>
+            <a:picLocks noChangeAspect="1" noChangeArrowheads="1"/>
+          </p:cNvPicPr>
+          <p:nvPr/>
+        </p:nvPicPr>
+        <p:blipFill>
+          <a:blip r:embed="rId2">
+            <a:extLst>
+              <a:ext uri="{28A0092B-C50C-407E-A947-70E740481C1C}">
+                <a14:useLocalDpi xmlns:a14="http://schemas.microsoft.com/office/drawing/2010/main" val="0"/>
+              </a:ext>
+            </a:extLst>
+          </a:blip>
+          <a:srcRect/>
+          <a:stretch>
+            <a:fillRect/>
+          </a:stretch>
+        </p:blipFill>
+        <p:spPr bwMode="auto">
+          <a:xfrm>
+            <a:off x="720725" y="1219200"/>
+            <a:ext cx="7702550" cy="4419600"/>
+          </a:xfrm>
+          <a:prstGeom prst="rect">
+            <a:avLst/>
+          </a:prstGeom>
+          <a:noFill/>
+          <a:ln>
+            <a:noFill/>
+          </a:ln>
+          <a:extLst>
+            <a:ext uri="{909E8E84-426E-40DD-AFC4-6F175D3DCCD1}">
+              <a14:hiddenFill xmlns:a14="http://schemas.microsoft.com/office/drawing/2010/main">
+                <a:solidFill>
+                  <a:schemeClr val="accent1"/>
+                </a:solidFill>
+              </a14:hiddenFill>
+            </a:ext>
+            <a:ext uri="{91240B29-F687-4F45-9708-019B960494DF}">
+              <a14:hiddenLine xmlns:a14="http://schemas.microsoft.com/office/drawing/2010/main" w="9525">
+                <a:solidFill>
+                  <a:schemeClr val="tx1"/>
+                </a:solidFill>
+                <a:miter lim="800000"/>
+                <a:headEnd/>
+                <a:tailEnd/>
+              </a14:hiddenLine>
+            </a:ext>
+          </a:extLst>
+        </p:spPr>
+      </p:pic>
+    </p:spTree>
+    <p:extLst>
+      <p:ext uri="{BB962C8B-B14F-4D97-AF65-F5344CB8AC3E}">
+        <p14:creationId xmlns:p14="http://schemas.microsoft.com/office/powerpoint/2010/main" val="1087066062"/>
+      </p:ext>
+    </p:extLst>
+  </p:cSld>
+  <p:clrMapOvr>
+    <a:masterClrMapping/>
+  </p:clrMapOvr>
+</p:sld>
+</file>
+
+<file path=ppt/slides/slide5.xml><?xml version="1.0" encoding="utf-8"?>
 <p:sld xmlns:a="http://schemas.openxmlformats.org/drawingml/2006/main" xmlns:r="http://schemas.openxmlformats.org/officeDocument/2006/relationships" xmlns:p="http://schemas.openxmlformats.org/presentationml/2006/main">
   <p:cSld>
     <p:spTree>

</xml_diff>

<commit_message>
First slide describes process-flow and milestones
</commit_message>
<xml_diff>
--- a/ofmw-forum2016-insight-valencia-demo.pptx
+++ b/ofmw-forum2016-insight-valencia-demo.pptx
@@ -5,11 +5,12 @@
     <p:sldMasterId id="2147483648" r:id="rId1"/>
   </p:sldMasterIdLst>
   <p:sldIdLst>
-    <p:sldId id="257" r:id="rId2"/>
-    <p:sldId id="259" r:id="rId3"/>
-    <p:sldId id="260" r:id="rId4"/>
-    <p:sldId id="261" r:id="rId5"/>
-    <p:sldId id="258" r:id="rId6"/>
+    <p:sldId id="262" r:id="rId2"/>
+    <p:sldId id="257" r:id="rId3"/>
+    <p:sldId id="259" r:id="rId4"/>
+    <p:sldId id="260" r:id="rId5"/>
+    <p:sldId id="261" r:id="rId6"/>
+    <p:sldId id="258" r:id="rId7"/>
   </p:sldIdLst>
   <p:sldSz cx="9144000" cy="6858000" type="screen4x3"/>
   <p:notesSz cx="6858000" cy="9144000"/>
@@ -3107,8 +3108,8 @@
         </p:nvSpPr>
         <p:spPr>
           <a:xfrm>
-            <a:off x="2712006" y="2185491"/>
-            <a:ext cx="1584176" cy="1584176"/>
+            <a:off x="1043608" y="188640"/>
+            <a:ext cx="2232248" cy="1440160"/>
           </a:xfrm>
           <a:prstGeom prst="roundRect">
             <a:avLst/>
@@ -3136,79 +3137,69 @@
           <a:p>
             <a:pPr algn="ctr"/>
             <a:r>
-              <a:rPr lang="nl-NL" dirty="0" smtClean="0"/>
-              <a:t>SOA </a:t>
-            </a:r>
-            <a:r>
               <a:rPr lang="nl-NL" dirty="0" err="1" smtClean="0"/>
-              <a:t>Composite</a:t>
-            </a:r>
-            <a:endParaRPr lang="nl-NL" dirty="0" smtClean="0"/>
-          </a:p>
-          <a:p>
-            <a:pPr algn="ctr"/>
-            <a:endParaRPr lang="nl-NL" dirty="0"/>
-          </a:p>
-          <a:p>
-            <a:pPr algn="ctr"/>
-            <a:endParaRPr lang="nl-NL" dirty="0" smtClean="0"/>
-          </a:p>
-          <a:p>
-            <a:pPr algn="ctr"/>
+              <a:t>Proposals</a:t>
+            </a:r>
+            <a:r>
+              <a:rPr lang="nl-NL" dirty="0" smtClean="0"/>
+              <a:t> are </a:t>
+            </a:r>
+            <a:r>
+              <a:rPr lang="nl-NL" dirty="0" err="1" smtClean="0"/>
+              <a:t>submitted</a:t>
+            </a:r>
+            <a:r>
+              <a:rPr lang="nl-NL" dirty="0" smtClean="0"/>
+              <a:t> for </a:t>
+            </a:r>
+            <a:r>
+              <a:rPr lang="nl-NL" dirty="0" err="1" smtClean="0"/>
+              <a:t>an</a:t>
+            </a:r>
+            <a:r>
+              <a:rPr lang="nl-NL" dirty="0" smtClean="0"/>
+              <a:t> artist </a:t>
+            </a:r>
+            <a:r>
+              <a:rPr lang="nl-NL" dirty="0" err="1" smtClean="0"/>
+              <a:t>to</a:t>
+            </a:r>
+            <a:r>
+              <a:rPr lang="nl-NL" dirty="0" smtClean="0"/>
+              <a:t> </a:t>
+            </a:r>
+            <a:r>
+              <a:rPr lang="nl-NL" dirty="0" err="1" smtClean="0"/>
+              <a:t>perform</a:t>
+            </a:r>
+            <a:r>
+              <a:rPr lang="nl-NL" dirty="0" smtClean="0"/>
+              <a:t> at </a:t>
+            </a:r>
+            <a:r>
+              <a:rPr lang="nl-NL" dirty="0" err="1" smtClean="0"/>
+              <a:t>an</a:t>
+            </a:r>
+            <a:r>
+              <a:rPr lang="nl-NL" dirty="0" smtClean="0"/>
+              <a:t> event</a:t>
+            </a:r>
             <a:endParaRPr lang="en-US" dirty="0"/>
           </a:p>
         </p:txBody>
       </p:sp>
       <p:sp>
         <p:nvSpPr>
-          <p:cNvPr id="3" name="Flowchart: Magnetic Disk 2"/>
+          <p:cNvPr id="3" name="Rounded Rectangle 2"/>
           <p:cNvSpPr/>
           <p:nvPr/>
         </p:nvSpPr>
         <p:spPr>
           <a:xfrm>
-            <a:off x="4944254" y="2974957"/>
-            <a:ext cx="1152128" cy="1152128"/>
-          </a:xfrm>
-          <a:prstGeom prst="flowChartMagneticDisk">
-            <a:avLst/>
-          </a:prstGeom>
-        </p:spPr>
-        <p:style>
-          <a:lnRef idx="1">
-            <a:schemeClr val="accent2"/>
-          </a:lnRef>
-          <a:fillRef idx="2">
-            <a:schemeClr val="accent2"/>
-          </a:fillRef>
-          <a:effectRef idx="1">
-            <a:schemeClr val="accent2"/>
-          </a:effectRef>
-          <a:fontRef idx="minor">
-            <a:schemeClr val="dk1"/>
-          </a:fontRef>
-        </p:style>
-        <p:txBody>
-          <a:bodyPr rtlCol="0" anchor="ctr"/>
-          <a:lstStyle/>
-          <a:p>
-            <a:pPr algn="ctr"/>
-            <a:endParaRPr lang="en-US"/>
-          </a:p>
-        </p:txBody>
-      </p:sp>
-      <p:sp>
-        <p:nvSpPr>
-          <p:cNvPr id="4" name="Flowchart: Direct Access Storage 3"/>
-          <p:cNvSpPr/>
-          <p:nvPr/>
-        </p:nvSpPr>
-        <p:spPr>
-          <a:xfrm>
-            <a:off x="4152166" y="2905571"/>
-            <a:ext cx="288032" cy="360040"/>
-          </a:xfrm>
-          <a:prstGeom prst="flowChartMagneticDrum">
+            <a:off x="3877120" y="908720"/>
+            <a:ext cx="2232248" cy="1440160"/>
+          </a:xfrm>
+          <a:prstGeom prst="roundRect">
             <a:avLst/>
           </a:prstGeom>
         </p:spPr>
@@ -3233,56 +3224,84 @@
           <a:lstStyle/>
           <a:p>
             <a:pPr algn="ctr"/>
-            <a:endParaRPr lang="en-US"/>
-          </a:p>
-        </p:txBody>
-      </p:sp>
-      <p:cxnSp>
-        <p:nvCxnSpPr>
-          <p:cNvPr id="10" name="Elbow Connector 9"/>
-          <p:cNvCxnSpPr>
-            <a:stCxn id="4" idx="4"/>
-            <a:endCxn id="3" idx="2"/>
-          </p:cNvCxnSpPr>
-          <p:nvPr/>
-        </p:nvCxnSpPr>
-        <p:spPr>
-          <a:xfrm>
-            <a:off x="4440198" y="3085591"/>
-            <a:ext cx="504056" cy="465430"/>
-          </a:xfrm>
-          <a:prstGeom prst="bentConnector3">
-            <a:avLst/>
-          </a:prstGeom>
-          <a:ln>
-            <a:tailEnd type="arrow"/>
-          </a:ln>
-        </p:spPr>
-        <p:style>
-          <a:lnRef idx="1">
-            <a:schemeClr val="accent1"/>
-          </a:lnRef>
-          <a:fillRef idx="0">
-            <a:schemeClr val="accent1"/>
-          </a:fillRef>
-          <a:effectRef idx="0">
-            <a:schemeClr val="accent1"/>
-          </a:effectRef>
-          <a:fontRef idx="minor">
-            <a:schemeClr val="tx1"/>
-          </a:fontRef>
-        </p:style>
-      </p:cxnSp>
-      <p:sp>
-        <p:nvSpPr>
-          <p:cNvPr id="11" name="Rounded Rectangle 10"/>
+            <a:r>
+              <a:rPr lang="nl-NL" dirty="0" err="1" smtClean="0"/>
+              <a:t>Each</a:t>
+            </a:r>
+            <a:r>
+              <a:rPr lang="nl-NL" dirty="0" smtClean="0"/>
+              <a:t> </a:t>
+            </a:r>
+            <a:r>
+              <a:rPr lang="nl-NL" dirty="0" err="1" smtClean="0"/>
+              <a:t>proposal</a:t>
+            </a:r>
+            <a:r>
+              <a:rPr lang="nl-NL" dirty="0" smtClean="0"/>
+              <a:t> is </a:t>
+            </a:r>
+            <a:r>
+              <a:rPr lang="nl-NL" dirty="0" err="1" smtClean="0"/>
+              <a:t>checked</a:t>
+            </a:r>
+            <a:r>
+              <a:rPr lang="nl-NL" dirty="0" smtClean="0"/>
+              <a:t> for </a:t>
+            </a:r>
+            <a:r>
+              <a:rPr lang="nl-NL" dirty="0" err="1" smtClean="0"/>
+              <a:t>duplicates</a:t>
+            </a:r>
+            <a:r>
+              <a:rPr lang="nl-NL" dirty="0" smtClean="0"/>
+              <a:t>, </a:t>
+            </a:r>
+            <a:r>
+              <a:rPr lang="nl-NL" dirty="0" err="1" smtClean="0"/>
+              <a:t>then</a:t>
+            </a:r>
+            <a:r>
+              <a:rPr lang="nl-NL" dirty="0" smtClean="0"/>
+              <a:t> </a:t>
+            </a:r>
+            <a:r>
+              <a:rPr lang="nl-NL" dirty="0" err="1" smtClean="0"/>
+              <a:t>validated</a:t>
+            </a:r>
+            <a:r>
+              <a:rPr lang="nl-NL" dirty="0" smtClean="0"/>
+              <a:t> (</a:t>
+            </a:r>
+            <a:r>
+              <a:rPr lang="nl-NL" dirty="0" err="1" smtClean="0"/>
+              <a:t>against</a:t>
+            </a:r>
+            <a:r>
+              <a:rPr lang="nl-NL" dirty="0" smtClean="0"/>
+              <a:t> business </a:t>
+            </a:r>
+            <a:r>
+              <a:rPr lang="nl-NL" dirty="0" err="1" smtClean="0"/>
+              <a:t>rules</a:t>
+            </a:r>
+            <a:r>
+              <a:rPr lang="nl-NL" dirty="0" smtClean="0"/>
+              <a:t>)</a:t>
+            </a:r>
+            <a:endParaRPr lang="en-US" dirty="0"/>
+          </a:p>
+        </p:txBody>
+      </p:sp>
+      <p:sp>
+        <p:nvSpPr>
+          <p:cNvPr id="4" name="Rounded Rectangle 3"/>
           <p:cNvSpPr/>
           <p:nvPr/>
         </p:nvSpPr>
         <p:spPr>
           <a:xfrm>
-            <a:off x="5112378" y="919709"/>
-            <a:ext cx="1584176" cy="1584176"/>
+            <a:off x="1403648" y="2204864"/>
+            <a:ext cx="2232248" cy="1440160"/>
           </a:xfrm>
           <a:prstGeom prst="roundRect">
             <a:avLst/>
@@ -3310,41 +3329,69 @@
           <a:p>
             <a:pPr algn="ctr"/>
             <a:r>
-              <a:rPr lang="nl-NL" dirty="0" smtClean="0"/>
-              <a:t>SOA </a:t>
-            </a:r>
-            <a:r>
               <a:rPr lang="nl-NL" dirty="0" err="1" smtClean="0"/>
-              <a:t>Composite</a:t>
-            </a:r>
-            <a:endParaRPr lang="nl-NL" dirty="0" smtClean="0"/>
-          </a:p>
-          <a:p>
-            <a:pPr algn="ctr"/>
-            <a:endParaRPr lang="nl-NL" dirty="0"/>
-          </a:p>
-          <a:p>
-            <a:pPr algn="ctr"/>
-            <a:endParaRPr lang="nl-NL" dirty="0" smtClean="0"/>
-          </a:p>
-          <a:p>
-            <a:pPr algn="ctr"/>
+              <a:t>Surviving</a:t>
+            </a:r>
+            <a:r>
+              <a:rPr lang="nl-NL" dirty="0" smtClean="0"/>
+              <a:t> </a:t>
+            </a:r>
+            <a:r>
+              <a:rPr lang="nl-NL" dirty="0" err="1" smtClean="0"/>
+              <a:t>proposals</a:t>
+            </a:r>
+            <a:r>
+              <a:rPr lang="nl-NL" dirty="0" smtClean="0"/>
+              <a:t> are </a:t>
+            </a:r>
+            <a:r>
+              <a:rPr lang="nl-NL" dirty="0" err="1" smtClean="0"/>
+              <a:t>submitted</a:t>
+            </a:r>
+            <a:r>
+              <a:rPr lang="nl-NL" dirty="0" smtClean="0"/>
+              <a:t> </a:t>
+            </a:r>
+            <a:r>
+              <a:rPr lang="nl-NL" dirty="0" err="1" smtClean="0"/>
+              <a:t>to</a:t>
+            </a:r>
+            <a:r>
+              <a:rPr lang="nl-NL" dirty="0" smtClean="0"/>
+              <a:t> a human actor for triage (</a:t>
+            </a:r>
+            <a:r>
+              <a:rPr lang="nl-NL" dirty="0" err="1" smtClean="0"/>
+              <a:t>approve</a:t>
+            </a:r>
+            <a:r>
+              <a:rPr lang="nl-NL" dirty="0" smtClean="0"/>
+              <a:t>/</a:t>
+            </a:r>
+            <a:r>
+              <a:rPr lang="nl-NL" dirty="0" err="1" smtClean="0"/>
+              <a:t>reject</a:t>
+            </a:r>
+            <a:r>
+              <a:rPr lang="nl-NL" dirty="0" smtClean="0"/>
+              <a:t>)</a:t>
+            </a:r>
             <a:endParaRPr lang="en-US" dirty="0"/>
           </a:p>
         </p:txBody>
       </p:sp>
       <p:sp>
         <p:nvSpPr>
-          <p:cNvPr id="13" name="Flowchart: Direct Access Storage 12"/>
+          <p:cNvPr id="5" name="Rounded Rectangle 4"/>
           <p:cNvSpPr/>
           <p:nvPr/>
         </p:nvSpPr>
         <p:spPr>
           <a:xfrm>
-            <a:off x="4968362" y="1567781"/>
-            <a:ext cx="288032" cy="360040"/>
-          </a:xfrm>
-          <a:prstGeom prst="flowChartMagneticDrum">
+            <a:off x="4262505" y="3117758"/>
+            <a:ext cx="2232248" cy="1440160"/>
+          </a:xfrm>
+          <a:prstGeom prst="roundRect">
             <a:avLst/>
           </a:prstGeom>
         </p:spPr>
@@ -3369,149 +3416,84 @@
           <a:lstStyle/>
           <a:p>
             <a:pPr algn="ctr"/>
-            <a:endParaRPr lang="en-US"/>
-          </a:p>
-        </p:txBody>
-      </p:sp>
-      <p:sp>
-        <p:nvSpPr>
-          <p:cNvPr id="15" name="Rectangular Callout 14"/>
+            <a:r>
+              <a:rPr lang="nl-NL" dirty="0" err="1" smtClean="0"/>
+              <a:t>One</a:t>
+            </a:r>
+            <a:r>
+              <a:rPr lang="nl-NL" dirty="0" smtClean="0"/>
+              <a:t> or more </a:t>
+            </a:r>
+            <a:r>
+              <a:rPr lang="nl-NL" dirty="0" err="1" smtClean="0"/>
+              <a:t>approved</a:t>
+            </a:r>
+            <a:r>
+              <a:rPr lang="nl-NL" dirty="0" smtClean="0"/>
+              <a:t> </a:t>
+            </a:r>
+            <a:r>
+              <a:rPr lang="nl-NL" dirty="0" err="1" smtClean="0"/>
+              <a:t>proposals</a:t>
+            </a:r>
+            <a:r>
+              <a:rPr lang="nl-NL" dirty="0" smtClean="0"/>
+              <a:t> are </a:t>
+            </a:r>
+            <a:r>
+              <a:rPr lang="nl-NL" dirty="0" err="1" smtClean="0"/>
+              <a:t>selected</a:t>
+            </a:r>
+            <a:r>
+              <a:rPr lang="nl-NL" dirty="0" smtClean="0"/>
+              <a:t> </a:t>
+            </a:r>
+            <a:r>
+              <a:rPr lang="nl-NL" dirty="0" err="1" smtClean="0"/>
+              <a:t>to</a:t>
+            </a:r>
+            <a:r>
+              <a:rPr lang="nl-NL" dirty="0" smtClean="0"/>
+              <a:t> enter </a:t>
+            </a:r>
+            <a:r>
+              <a:rPr lang="nl-NL" dirty="0" err="1" smtClean="0"/>
+              <a:t>negotiotation</a:t>
+            </a:r>
+            <a:r>
+              <a:rPr lang="nl-NL" dirty="0" smtClean="0"/>
+              <a:t> </a:t>
+            </a:r>
+            <a:r>
+              <a:rPr lang="nl-NL" dirty="0" err="1" smtClean="0"/>
+              <a:t>phase</a:t>
+            </a:r>
+            <a:r>
+              <a:rPr lang="nl-NL" dirty="0" smtClean="0"/>
+              <a:t> </a:t>
+            </a:r>
+            <a:r>
+              <a:rPr lang="nl-NL" dirty="0" err="1" smtClean="0"/>
+              <a:t>with</a:t>
+            </a:r>
+            <a:r>
+              <a:rPr lang="nl-NL" dirty="0" smtClean="0"/>
+              <a:t> artist </a:t>
+            </a:r>
+            <a:endParaRPr lang="en-US" dirty="0"/>
+          </a:p>
+        </p:txBody>
+      </p:sp>
+      <p:sp>
+        <p:nvSpPr>
+          <p:cNvPr id="6" name="Rounded Rectangle 5"/>
           <p:cNvSpPr/>
           <p:nvPr/>
         </p:nvSpPr>
         <p:spPr>
           <a:xfrm>
-            <a:off x="1800010" y="1393403"/>
-            <a:ext cx="1823991" cy="436240"/>
-          </a:xfrm>
-          <a:prstGeom prst="wedgeRectCallout">
-            <a:avLst>
-              <a:gd name="adj1" fmla="val 9496"/>
-              <a:gd name="adj2" fmla="val 156081"/>
-            </a:avLst>
-          </a:prstGeom>
-        </p:spPr>
-        <p:style>
-          <a:lnRef idx="1">
-            <a:schemeClr val="accent6"/>
-          </a:lnRef>
-          <a:fillRef idx="3">
-            <a:schemeClr val="accent6"/>
-          </a:fillRef>
-          <a:effectRef idx="2">
-            <a:schemeClr val="accent6"/>
-          </a:effectRef>
-          <a:fontRef idx="minor">
-            <a:schemeClr val="lt1"/>
-          </a:fontRef>
-        </p:style>
-        <p:txBody>
-          <a:bodyPr rtlCol="0" anchor="ctr"/>
-          <a:lstStyle/>
-          <a:p>
-            <a:pPr algn="ctr"/>
-            <a:r>
-              <a:rPr lang="nl-NL" sz="1400" dirty="0" err="1" smtClean="0"/>
-              <a:t>SendInArtistProposal</a:t>
-            </a:r>
-            <a:endParaRPr lang="en-US" sz="1400" dirty="0"/>
-          </a:p>
-        </p:txBody>
-      </p:sp>
-      <p:sp>
-        <p:nvSpPr>
-          <p:cNvPr id="16" name="Rectangular Callout 15"/>
-          <p:cNvSpPr/>
-          <p:nvPr/>
-        </p:nvSpPr>
-        <p:spPr>
-          <a:xfrm>
-            <a:off x="6180602" y="616496"/>
-            <a:ext cx="1823991" cy="436240"/>
-          </a:xfrm>
-          <a:prstGeom prst="wedgeRectCallout">
-            <a:avLst>
-              <a:gd name="adj1" fmla="val -37356"/>
-              <a:gd name="adj2" fmla="val 101230"/>
-            </a:avLst>
-          </a:prstGeom>
-        </p:spPr>
-        <p:style>
-          <a:lnRef idx="1">
-            <a:schemeClr val="accent6"/>
-          </a:lnRef>
-          <a:fillRef idx="3">
-            <a:schemeClr val="accent6"/>
-          </a:fillRef>
-          <a:effectRef idx="2">
-            <a:schemeClr val="accent6"/>
-          </a:effectRef>
-          <a:fontRef idx="minor">
-            <a:schemeClr val="lt1"/>
-          </a:fontRef>
-        </p:style>
-        <p:txBody>
-          <a:bodyPr rtlCol="0" anchor="ctr"/>
-          <a:lstStyle/>
-          <a:p>
-            <a:pPr algn="ctr"/>
-            <a:r>
-              <a:rPr lang="nl-NL" sz="1400" dirty="0" err="1" smtClean="0"/>
-              <a:t>EvaluateArtistProposal</a:t>
-            </a:r>
-            <a:endParaRPr lang="en-US" sz="1400" dirty="0"/>
-          </a:p>
-        </p:txBody>
-      </p:sp>
-      <p:cxnSp>
-        <p:nvCxnSpPr>
-          <p:cNvPr id="18" name="Elbow Connector 17"/>
-          <p:cNvCxnSpPr>
-            <a:stCxn id="3" idx="1"/>
-            <a:endCxn id="13" idx="1"/>
-          </p:cNvCxnSpPr>
-          <p:nvPr/>
-        </p:nvCxnSpPr>
-        <p:spPr>
-          <a:xfrm rot="16200000" flipV="1">
-            <a:off x="4630762" y="2085401"/>
-            <a:ext cx="1227156" cy="551956"/>
-          </a:xfrm>
-          <a:prstGeom prst="bentConnector4">
-            <a:avLst>
-              <a:gd name="adj1" fmla="val 22470"/>
-              <a:gd name="adj2" fmla="val 145784"/>
-            </a:avLst>
-          </a:prstGeom>
-          <a:ln>
-            <a:tailEnd type="arrow"/>
-          </a:ln>
-        </p:spPr>
-        <p:style>
-          <a:lnRef idx="1">
-            <a:schemeClr val="accent1"/>
-          </a:lnRef>
-          <a:fillRef idx="0">
-            <a:schemeClr val="accent1"/>
-          </a:fillRef>
-          <a:effectRef idx="0">
-            <a:schemeClr val="accent1"/>
-          </a:effectRef>
-          <a:fontRef idx="minor">
-            <a:schemeClr val="tx1"/>
-          </a:fontRef>
-        </p:style>
-      </p:cxnSp>
-      <p:sp>
-        <p:nvSpPr>
-          <p:cNvPr id="24" name="Rounded Rectangle 23"/>
-          <p:cNvSpPr/>
-          <p:nvPr/>
-        </p:nvSpPr>
-        <p:spPr>
-          <a:xfrm>
-            <a:off x="6732559" y="3712840"/>
-            <a:ext cx="1584176" cy="1584176"/>
+            <a:off x="863588" y="4480131"/>
+            <a:ext cx="3312368" cy="1440160"/>
           </a:xfrm>
           <a:prstGeom prst="roundRect">
             <a:avLst/>
@@ -3539,41 +3521,125 @@
           <a:p>
             <a:pPr algn="ctr"/>
             <a:r>
-              <a:rPr lang="nl-NL" dirty="0" smtClean="0"/>
-              <a:t>SOA </a:t>
-            </a:r>
-            <a:r>
               <a:rPr lang="nl-NL" dirty="0" err="1" smtClean="0"/>
-              <a:t>Composite</a:t>
-            </a:r>
-            <a:endParaRPr lang="nl-NL" dirty="0" smtClean="0"/>
-          </a:p>
-          <a:p>
-            <a:pPr algn="ctr"/>
-            <a:endParaRPr lang="nl-NL" dirty="0"/>
-          </a:p>
-          <a:p>
-            <a:pPr algn="ctr"/>
-            <a:endParaRPr lang="nl-NL" dirty="0" smtClean="0"/>
-          </a:p>
-          <a:p>
-            <a:pPr algn="ctr"/>
+              <a:t>When</a:t>
+            </a:r>
+            <a:r>
+              <a:rPr lang="nl-NL" dirty="0" smtClean="0"/>
+              <a:t> </a:t>
+            </a:r>
+            <a:r>
+              <a:rPr lang="nl-NL" dirty="0" err="1" smtClean="0"/>
+              <a:t>the</a:t>
+            </a:r>
+            <a:r>
+              <a:rPr lang="nl-NL" dirty="0" smtClean="0"/>
+              <a:t> </a:t>
+            </a:r>
+            <a:r>
+              <a:rPr lang="nl-NL" dirty="0" err="1" smtClean="0"/>
+              <a:t>negotation</a:t>
+            </a:r>
+            <a:r>
+              <a:rPr lang="nl-NL" dirty="0" smtClean="0"/>
+              <a:t> is </a:t>
+            </a:r>
+            <a:r>
+              <a:rPr lang="nl-NL" dirty="0" err="1" smtClean="0"/>
+              <a:t>successful</a:t>
+            </a:r>
+            <a:r>
+              <a:rPr lang="nl-NL" dirty="0" smtClean="0"/>
+              <a:t>, </a:t>
+            </a:r>
+            <a:r>
+              <a:rPr lang="nl-NL" dirty="0" err="1" smtClean="0"/>
+              <a:t>the</a:t>
+            </a:r>
+            <a:r>
+              <a:rPr lang="nl-NL" dirty="0" smtClean="0"/>
+              <a:t> </a:t>
+            </a:r>
+            <a:r>
+              <a:rPr lang="nl-NL" dirty="0" err="1" smtClean="0"/>
+              <a:t>proposal</a:t>
+            </a:r>
+            <a:r>
+              <a:rPr lang="nl-NL" dirty="0" smtClean="0"/>
+              <a:t> is </a:t>
+            </a:r>
+            <a:r>
+              <a:rPr lang="nl-NL" dirty="0" err="1" smtClean="0"/>
+              <a:t>converted</a:t>
+            </a:r>
+            <a:r>
+              <a:rPr lang="nl-NL" dirty="0" smtClean="0"/>
+              <a:t> </a:t>
+            </a:r>
+            <a:r>
+              <a:rPr lang="nl-NL" dirty="0" err="1" smtClean="0"/>
+              <a:t>to</a:t>
+            </a:r>
+            <a:r>
+              <a:rPr lang="nl-NL" dirty="0" smtClean="0"/>
+              <a:t> ‘engagement’; </a:t>
+            </a:r>
+            <a:r>
+              <a:rPr lang="nl-NL" dirty="0" err="1" smtClean="0"/>
+              <a:t>all</a:t>
+            </a:r>
+            <a:r>
+              <a:rPr lang="nl-NL" dirty="0" smtClean="0"/>
+              <a:t> </a:t>
+            </a:r>
+            <a:r>
+              <a:rPr lang="nl-NL" dirty="0" err="1" smtClean="0"/>
+              <a:t>other</a:t>
+            </a:r>
+            <a:r>
+              <a:rPr lang="nl-NL" dirty="0" smtClean="0"/>
+              <a:t> </a:t>
+            </a:r>
+            <a:r>
+              <a:rPr lang="nl-NL" dirty="0" err="1" smtClean="0"/>
+              <a:t>proposals</a:t>
+            </a:r>
+            <a:r>
+              <a:rPr lang="nl-NL" dirty="0" smtClean="0"/>
+              <a:t> are </a:t>
+            </a:r>
+            <a:r>
+              <a:rPr lang="nl-NL" dirty="0" err="1" smtClean="0"/>
+              <a:t>closed</a:t>
+            </a:r>
+            <a:r>
+              <a:rPr lang="nl-NL" dirty="0" smtClean="0"/>
+              <a:t> at </a:t>
+            </a:r>
+            <a:r>
+              <a:rPr lang="nl-NL" dirty="0" err="1" smtClean="0"/>
+              <a:t>that</a:t>
+            </a:r>
+            <a:r>
+              <a:rPr lang="nl-NL" dirty="0" smtClean="0"/>
+              <a:t> point</a:t>
+            </a:r>
             <a:endParaRPr lang="en-US" dirty="0"/>
           </a:p>
         </p:txBody>
       </p:sp>
       <p:sp>
         <p:nvSpPr>
-          <p:cNvPr id="25" name="Flowchart: Direct Access Storage 24"/>
+          <p:cNvPr id="7" name="Rounded Rectangle 6"/>
           <p:cNvSpPr/>
           <p:nvPr/>
         </p:nvSpPr>
         <p:spPr>
           <a:xfrm>
-            <a:off x="6588543" y="4561755"/>
-            <a:ext cx="288032" cy="360040"/>
-          </a:xfrm>
-          <a:prstGeom prst="flowChartMagneticDrum">
+            <a:off x="4428225" y="5085184"/>
+            <a:ext cx="3888432" cy="1440160"/>
+          </a:xfrm>
+          <a:prstGeom prst="roundRect">
             <a:avLst/>
           </a:prstGeom>
         </p:spPr>
@@ -3598,100 +3664,176 @@
           <a:lstStyle/>
           <a:p>
             <a:pPr algn="ctr"/>
-            <a:endParaRPr lang="en-US"/>
-          </a:p>
-        </p:txBody>
-      </p:sp>
-      <p:sp>
-        <p:nvSpPr>
-          <p:cNvPr id="26" name="Rectangular Callout 25"/>
+            <a:r>
+              <a:rPr lang="nl-NL" dirty="0" err="1" smtClean="0"/>
+              <a:t>When</a:t>
+            </a:r>
+            <a:r>
+              <a:rPr lang="nl-NL" dirty="0" smtClean="0"/>
+              <a:t> </a:t>
+            </a:r>
+            <a:r>
+              <a:rPr lang="nl-NL" dirty="0" err="1" smtClean="0"/>
+              <a:t>the</a:t>
+            </a:r>
+            <a:r>
+              <a:rPr lang="nl-NL" dirty="0" smtClean="0"/>
+              <a:t> </a:t>
+            </a:r>
+            <a:r>
+              <a:rPr lang="nl-NL" dirty="0" err="1" smtClean="0"/>
+              <a:t>negotation</a:t>
+            </a:r>
+            <a:r>
+              <a:rPr lang="nl-NL" dirty="0" smtClean="0"/>
+              <a:t> is </a:t>
+            </a:r>
+            <a:r>
+              <a:rPr lang="nl-NL" dirty="0" err="1" smtClean="0"/>
+              <a:t>not</a:t>
+            </a:r>
+            <a:r>
+              <a:rPr lang="nl-NL" dirty="0" smtClean="0"/>
+              <a:t> </a:t>
+            </a:r>
+            <a:r>
+              <a:rPr lang="nl-NL" dirty="0" err="1" smtClean="0"/>
+              <a:t>successful</a:t>
+            </a:r>
+            <a:r>
+              <a:rPr lang="nl-NL" dirty="0" smtClean="0"/>
+              <a:t>, </a:t>
+            </a:r>
+            <a:r>
+              <a:rPr lang="nl-NL" dirty="0" err="1" smtClean="0"/>
+              <a:t>the</a:t>
+            </a:r>
+            <a:r>
+              <a:rPr lang="nl-NL" dirty="0" smtClean="0"/>
+              <a:t> </a:t>
+            </a:r>
+            <a:r>
+              <a:rPr lang="nl-NL" dirty="0" err="1" smtClean="0"/>
+              <a:t>proposal</a:t>
+            </a:r>
+            <a:r>
+              <a:rPr lang="nl-NL" dirty="0" smtClean="0"/>
+              <a:t> is </a:t>
+            </a:r>
+            <a:r>
+              <a:rPr lang="nl-NL" dirty="0" err="1" smtClean="0"/>
+              <a:t>converted</a:t>
+            </a:r>
+            <a:r>
+              <a:rPr lang="nl-NL" dirty="0" smtClean="0"/>
+              <a:t> </a:t>
+            </a:r>
+            <a:r>
+              <a:rPr lang="nl-NL" dirty="0" err="1" smtClean="0"/>
+              <a:t>to</a:t>
+            </a:r>
+            <a:r>
+              <a:rPr lang="nl-NL" dirty="0" smtClean="0"/>
+              <a:t> ‘</a:t>
+            </a:r>
+            <a:r>
+              <a:rPr lang="nl-NL" dirty="0" err="1" smtClean="0"/>
+              <a:t>not</a:t>
+            </a:r>
+            <a:r>
+              <a:rPr lang="nl-NL" dirty="0" smtClean="0"/>
+              <a:t> </a:t>
+            </a:r>
+            <a:r>
+              <a:rPr lang="nl-NL" dirty="0" err="1" smtClean="0"/>
+              <a:t>feasible</a:t>
+            </a:r>
+            <a:r>
+              <a:rPr lang="nl-NL" dirty="0" smtClean="0"/>
+              <a:t>’. </a:t>
+            </a:r>
+            <a:r>
+              <a:rPr lang="nl-NL" dirty="0" err="1" smtClean="0"/>
+              <a:t>Another</a:t>
+            </a:r>
+            <a:r>
+              <a:rPr lang="nl-NL" dirty="0" smtClean="0"/>
+              <a:t> </a:t>
+            </a:r>
+            <a:r>
+              <a:rPr lang="nl-NL" dirty="0" err="1" smtClean="0"/>
+              <a:t>one</a:t>
+            </a:r>
+            <a:r>
+              <a:rPr lang="nl-NL" dirty="0" smtClean="0"/>
+              <a:t> of </a:t>
+            </a:r>
+            <a:r>
+              <a:rPr lang="nl-NL" dirty="0" err="1" smtClean="0"/>
+              <a:t>the</a:t>
+            </a:r>
+            <a:r>
+              <a:rPr lang="nl-NL" dirty="0" smtClean="0"/>
+              <a:t> </a:t>
+            </a:r>
+            <a:r>
+              <a:rPr lang="nl-NL" dirty="0" err="1" smtClean="0"/>
+              <a:t>approved</a:t>
+            </a:r>
+            <a:r>
+              <a:rPr lang="nl-NL" dirty="0" smtClean="0"/>
+              <a:t> </a:t>
+            </a:r>
+            <a:r>
+              <a:rPr lang="nl-NL" dirty="0" err="1" smtClean="0"/>
+              <a:t>proposals</a:t>
+            </a:r>
+            <a:r>
+              <a:rPr lang="nl-NL" dirty="0" smtClean="0"/>
+              <a:t> </a:t>
+            </a:r>
+            <a:r>
+              <a:rPr lang="nl-NL" dirty="0" err="1" smtClean="0"/>
+              <a:t>can</a:t>
+            </a:r>
+            <a:r>
+              <a:rPr lang="nl-NL" dirty="0" smtClean="0"/>
+              <a:t> </a:t>
+            </a:r>
+            <a:r>
+              <a:rPr lang="nl-NL" dirty="0" err="1" smtClean="0"/>
+              <a:t>now</a:t>
+            </a:r>
+            <a:r>
+              <a:rPr lang="nl-NL" dirty="0" smtClean="0"/>
+              <a:t> </a:t>
+            </a:r>
+            <a:r>
+              <a:rPr lang="nl-NL" dirty="0" err="1" smtClean="0"/>
+              <a:t>be</a:t>
+            </a:r>
+            <a:r>
+              <a:rPr lang="nl-NL" dirty="0" smtClean="0"/>
+              <a:t> </a:t>
+            </a:r>
+            <a:r>
+              <a:rPr lang="nl-NL" dirty="0" err="1" smtClean="0"/>
+              <a:t>promoted</a:t>
+            </a:r>
+            <a:endParaRPr lang="en-US" dirty="0"/>
+          </a:p>
+        </p:txBody>
+      </p:sp>
+      <p:sp>
+        <p:nvSpPr>
+          <p:cNvPr id="8" name="Rounded Rectangle 7"/>
           <p:cNvSpPr/>
           <p:nvPr/>
         </p:nvSpPr>
         <p:spPr>
           <a:xfrm>
-            <a:off x="7164288" y="5657056"/>
-            <a:ext cx="1823991" cy="436240"/>
-          </a:xfrm>
-          <a:prstGeom prst="wedgeRectCallout">
-            <a:avLst>
-              <a:gd name="adj1" fmla="val -15335"/>
-              <a:gd name="adj2" fmla="val -157354"/>
-            </a:avLst>
-          </a:prstGeom>
-        </p:spPr>
-        <p:style>
-          <a:lnRef idx="1">
-            <a:schemeClr val="accent6"/>
-          </a:lnRef>
-          <a:fillRef idx="3">
-            <a:schemeClr val="accent6"/>
-          </a:fillRef>
-          <a:effectRef idx="2">
-            <a:schemeClr val="accent6"/>
-          </a:effectRef>
-          <a:fontRef idx="minor">
-            <a:schemeClr val="lt1"/>
-          </a:fontRef>
-        </p:style>
-        <p:txBody>
-          <a:bodyPr rtlCol="0" anchor="ctr"/>
-          <a:lstStyle/>
-          <a:p>
-            <a:pPr algn="ctr"/>
-            <a:r>
-              <a:rPr lang="nl-NL" sz="1400" dirty="0" err="1" smtClean="0"/>
-              <a:t>JudgeArtistProposal</a:t>
-            </a:r>
-            <a:endParaRPr lang="en-US" sz="1400" dirty="0"/>
-          </a:p>
-        </p:txBody>
-      </p:sp>
-      <p:cxnSp>
-        <p:nvCxnSpPr>
-          <p:cNvPr id="27" name="Elbow Connector 26"/>
-          <p:cNvCxnSpPr>
-            <a:endCxn id="25" idx="1"/>
-          </p:cNvCxnSpPr>
-          <p:nvPr/>
-        </p:nvCxnSpPr>
-        <p:spPr>
-          <a:xfrm>
-            <a:off x="6096382" y="3751864"/>
-            <a:ext cx="492161" cy="989911"/>
-          </a:xfrm>
-          <a:prstGeom prst="bentConnector3">
-            <a:avLst/>
-          </a:prstGeom>
-          <a:ln>
-            <a:tailEnd type="arrow"/>
-          </a:ln>
-        </p:spPr>
-        <p:style>
-          <a:lnRef idx="1">
-            <a:schemeClr val="accent1"/>
-          </a:lnRef>
-          <a:fillRef idx="0">
-            <a:schemeClr val="accent1"/>
-          </a:fillRef>
-          <a:effectRef idx="0">
-            <a:schemeClr val="accent1"/>
-          </a:effectRef>
-          <a:fontRef idx="minor">
-            <a:schemeClr val="tx1"/>
-          </a:fontRef>
-        </p:style>
-      </p:cxnSp>
-      <p:sp>
-        <p:nvSpPr>
-          <p:cNvPr id="29" name="Rounded Rectangle 28"/>
-          <p:cNvSpPr/>
-          <p:nvPr/>
-        </p:nvSpPr>
-        <p:spPr>
-          <a:xfrm>
-            <a:off x="3180058" y="2974957"/>
-            <a:ext cx="648072" cy="351656"/>
+            <a:off x="3497282" y="111061"/>
+            <a:ext cx="1357348" cy="291745"/>
           </a:xfrm>
           <a:prstGeom prst="roundRect">
             <a:avLst/>
@@ -3699,13 +3841,13 @@
         </p:spPr>
         <p:style>
           <a:lnRef idx="1">
-            <a:schemeClr val="accent4"/>
+            <a:schemeClr val="accent3"/>
           </a:lnRef>
           <a:fillRef idx="2">
-            <a:schemeClr val="accent4"/>
+            <a:schemeClr val="accent3"/>
           </a:fillRef>
           <a:effectRef idx="1">
-            <a:schemeClr val="accent4"/>
+            <a:schemeClr val="accent3"/>
           </a:effectRef>
           <a:fontRef idx="minor">
             <a:schemeClr val="dk1"/>
@@ -3717,102 +3859,23 @@
           <a:p>
             <a:pPr algn="ctr"/>
             <a:r>
-              <a:rPr lang="nl-NL" dirty="0" smtClean="0"/>
-              <a:t>M</a:t>
+              <a:rPr lang="nl-NL" dirty="0" err="1" smtClean="0"/>
+              <a:t>Initiated</a:t>
             </a:r>
             <a:endParaRPr lang="en-US" dirty="0"/>
           </a:p>
         </p:txBody>
       </p:sp>
-      <p:cxnSp>
-        <p:nvCxnSpPr>
-          <p:cNvPr id="31" name="Elbow Connector 30"/>
-          <p:cNvCxnSpPr>
-            <a:endCxn id="29" idx="1"/>
-          </p:cNvCxnSpPr>
-          <p:nvPr/>
-        </p:nvCxnSpPr>
-        <p:spPr>
-          <a:xfrm>
-            <a:off x="2856022" y="3013583"/>
-            <a:ext cx="324036" cy="137202"/>
-          </a:xfrm>
-          <a:prstGeom prst="bentConnector3">
-            <a:avLst/>
-          </a:prstGeom>
-          <a:ln>
-            <a:solidFill>
-              <a:schemeClr val="tx2">
-                <a:lumMod val="50000"/>
-              </a:schemeClr>
-            </a:solidFill>
-          </a:ln>
-        </p:spPr>
-        <p:style>
-          <a:lnRef idx="1">
-            <a:schemeClr val="accent1"/>
-          </a:lnRef>
-          <a:fillRef idx="0">
-            <a:schemeClr val="accent1"/>
-          </a:fillRef>
-          <a:effectRef idx="0">
-            <a:schemeClr val="accent1"/>
-          </a:effectRef>
-          <a:fontRef idx="minor">
-            <a:schemeClr val="tx1"/>
-          </a:fontRef>
-        </p:style>
-      </p:cxnSp>
-      <p:cxnSp>
-        <p:nvCxnSpPr>
-          <p:cNvPr id="33" name="Elbow Connector 32"/>
-          <p:cNvCxnSpPr>
-            <a:stCxn id="29" idx="3"/>
-            <a:endCxn id="4" idx="1"/>
-          </p:cNvCxnSpPr>
-          <p:nvPr/>
-        </p:nvCxnSpPr>
-        <p:spPr>
-          <a:xfrm flipV="1">
-            <a:off x="3828130" y="3085591"/>
-            <a:ext cx="324036" cy="65194"/>
-          </a:xfrm>
-          <a:prstGeom prst="bentConnector3">
-            <a:avLst/>
-          </a:prstGeom>
-          <a:ln>
-            <a:solidFill>
-              <a:schemeClr val="tx2">
-                <a:lumMod val="50000"/>
-              </a:schemeClr>
-            </a:solidFill>
-          </a:ln>
-        </p:spPr>
-        <p:style>
-          <a:lnRef idx="1">
-            <a:schemeClr val="accent1"/>
-          </a:lnRef>
-          <a:fillRef idx="0">
-            <a:schemeClr val="accent1"/>
-          </a:fillRef>
-          <a:effectRef idx="0">
-            <a:schemeClr val="accent1"/>
-          </a:effectRef>
-          <a:fontRef idx="minor">
-            <a:schemeClr val="tx1"/>
-          </a:fontRef>
-        </p:style>
-      </p:cxnSp>
-      <p:sp>
-        <p:nvSpPr>
-          <p:cNvPr id="34" name="Rounded Rectangle 33"/>
+      <p:sp>
+        <p:nvSpPr>
+          <p:cNvPr id="9" name="Rounded Rectangle 8"/>
           <p:cNvSpPr/>
           <p:nvPr/>
         </p:nvSpPr>
         <p:spPr>
           <a:xfrm>
-            <a:off x="5400410" y="1819809"/>
-            <a:ext cx="432048" cy="387660"/>
+            <a:off x="6304730" y="1249048"/>
+            <a:ext cx="1357348" cy="291745"/>
           </a:xfrm>
           <a:prstGeom prst="roundRect">
             <a:avLst/>
@@ -3820,13 +3883,13 @@
         </p:spPr>
         <p:style>
           <a:lnRef idx="1">
-            <a:schemeClr val="accent1"/>
+            <a:schemeClr val="accent2"/>
           </a:lnRef>
           <a:fillRef idx="2">
-            <a:schemeClr val="accent1"/>
+            <a:schemeClr val="accent2"/>
           </a:fillRef>
           <a:effectRef idx="1">
-            <a:schemeClr val="accent1"/>
+            <a:schemeClr val="accent2"/>
           </a:effectRef>
           <a:fontRef idx="minor">
             <a:schemeClr val="dk1"/>
@@ -3838,8 +3901,8 @@
           <a:p>
             <a:pPr algn="ctr"/>
             <a:r>
-              <a:rPr lang="nl-NL" dirty="0" smtClean="0"/>
-              <a:t>B</a:t>
+              <a:rPr lang="nl-NL" dirty="0" err="1" smtClean="0"/>
+              <a:t>Duplicate</a:t>
             </a:r>
             <a:endParaRPr lang="en-US" dirty="0"/>
           </a:p>
@@ -3847,14 +3910,14 @@
       </p:sp>
       <p:sp>
         <p:nvSpPr>
-          <p:cNvPr id="35" name="Rounded Rectangle 34"/>
+          <p:cNvPr id="10" name="Rounded Rectangle 9"/>
           <p:cNvSpPr/>
           <p:nvPr/>
         </p:nvSpPr>
         <p:spPr>
           <a:xfrm>
-            <a:off x="6096699" y="1631405"/>
-            <a:ext cx="432048" cy="387660"/>
+            <a:off x="6300192" y="1693193"/>
+            <a:ext cx="1357348" cy="291745"/>
           </a:xfrm>
           <a:prstGeom prst="roundRect">
             <a:avLst/>
@@ -3862,16 +3925,16 @@
         </p:spPr>
         <p:style>
           <a:lnRef idx="1">
-            <a:schemeClr val="accent6"/>
-          </a:lnRef>
-          <a:fillRef idx="3">
-            <a:schemeClr val="accent6"/>
-          </a:fillRef>
-          <a:effectRef idx="2">
-            <a:schemeClr val="accent6"/>
-          </a:effectRef>
-          <a:fontRef idx="minor">
-            <a:schemeClr val="lt1"/>
+            <a:schemeClr val="accent2"/>
+          </a:lnRef>
+          <a:fillRef idx="2">
+            <a:schemeClr val="accent2"/>
+          </a:fillRef>
+          <a:effectRef idx="1">
+            <a:schemeClr val="accent2"/>
+          </a:effectRef>
+          <a:fontRef idx="minor">
+            <a:schemeClr val="dk1"/>
           </a:fontRef>
         </p:style>
         <p:txBody>
@@ -3880,101 +3943,23 @@
           <a:p>
             <a:pPr algn="ctr"/>
             <a:r>
-              <a:rPr lang="nl-NL" sz="1400" dirty="0" smtClean="0"/>
-              <a:t>BR</a:t>
-            </a:r>
-            <a:endParaRPr lang="en-US" sz="1400" dirty="0"/>
-          </a:p>
-        </p:txBody>
-      </p:sp>
-      <p:sp>
-        <p:nvSpPr>
-          <p:cNvPr id="36" name="Flowchart: Direct Access Storage 35"/>
+              <a:rPr lang="nl-NL" dirty="0" err="1" smtClean="0"/>
+              <a:t>Invalid</a:t>
+            </a:r>
+            <a:endParaRPr lang="en-US" dirty="0"/>
+          </a:p>
+        </p:txBody>
+      </p:sp>
+      <p:sp>
+        <p:nvSpPr>
+          <p:cNvPr id="11" name="Rounded Rectangle 10"/>
           <p:cNvSpPr/>
           <p:nvPr/>
         </p:nvSpPr>
         <p:spPr>
           <a:xfrm>
-            <a:off x="6624546" y="1631405"/>
-            <a:ext cx="288032" cy="360040"/>
-          </a:xfrm>
-          <a:prstGeom prst="flowChartMagneticDrum">
-            <a:avLst/>
-          </a:prstGeom>
-        </p:spPr>
-        <p:style>
-          <a:lnRef idx="2">
-            <a:schemeClr val="accent1">
-              <a:shade val="50000"/>
-            </a:schemeClr>
-          </a:lnRef>
-          <a:fillRef idx="1">
-            <a:schemeClr val="accent1"/>
-          </a:fillRef>
-          <a:effectRef idx="0">
-            <a:schemeClr val="accent1"/>
-          </a:effectRef>
-          <a:fontRef idx="minor">
-            <a:schemeClr val="lt1"/>
-          </a:fontRef>
-        </p:style>
-        <p:txBody>
-          <a:bodyPr rtlCol="0" anchor="ctr"/>
-          <a:lstStyle/>
-          <a:p>
-            <a:pPr algn="ctr"/>
-            <a:endParaRPr lang="en-US"/>
-          </a:p>
-        </p:txBody>
-      </p:sp>
-      <p:cxnSp>
-        <p:nvCxnSpPr>
-          <p:cNvPr id="41" name="Elbow Connector 40"/>
-          <p:cNvCxnSpPr>
-            <a:stCxn id="36" idx="4"/>
-          </p:cNvCxnSpPr>
-          <p:nvPr/>
-        </p:nvCxnSpPr>
-        <p:spPr>
-          <a:xfrm flipH="1">
-            <a:off x="5832458" y="1811425"/>
-            <a:ext cx="1080120" cy="1382178"/>
-          </a:xfrm>
-          <a:prstGeom prst="bentConnector4">
-            <a:avLst>
-              <a:gd name="adj1" fmla="val -21164"/>
-              <a:gd name="adj2" fmla="val 65786"/>
-            </a:avLst>
-          </a:prstGeom>
-          <a:ln>
-            <a:tailEnd type="arrow"/>
-          </a:ln>
-        </p:spPr>
-        <p:style>
-          <a:lnRef idx="1">
-            <a:schemeClr val="accent1"/>
-          </a:lnRef>
-          <a:fillRef idx="0">
-            <a:schemeClr val="accent1"/>
-          </a:fillRef>
-          <a:effectRef idx="0">
-            <a:schemeClr val="accent1"/>
-          </a:effectRef>
-          <a:fontRef idx="minor">
-            <a:schemeClr val="tx1"/>
-          </a:fontRef>
-        </p:style>
-      </p:cxnSp>
-      <p:sp>
-        <p:nvSpPr>
-          <p:cNvPr id="43" name="Rounded Rectangle 42"/>
-          <p:cNvSpPr/>
-          <p:nvPr/>
-        </p:nvSpPr>
-        <p:spPr>
-          <a:xfrm>
-            <a:off x="7008377" y="4693332"/>
-            <a:ext cx="432048" cy="387660"/>
+            <a:off x="6304730" y="2400006"/>
+            <a:ext cx="1558030" cy="291745"/>
           </a:xfrm>
           <a:prstGeom prst="roundRect">
             <a:avLst/>
@@ -3982,13 +3967,13 @@
         </p:spPr>
         <p:style>
           <a:lnRef idx="1">
-            <a:schemeClr val="accent1"/>
+            <a:schemeClr val="accent3"/>
           </a:lnRef>
           <a:fillRef idx="2">
-            <a:schemeClr val="accent1"/>
+            <a:schemeClr val="accent3"/>
           </a:fillRef>
           <a:effectRef idx="1">
-            <a:schemeClr val="accent1"/>
+            <a:schemeClr val="accent3"/>
           </a:effectRef>
           <a:fontRef idx="minor">
             <a:schemeClr val="dk1"/>
@@ -4000,23 +3985,27 @@
           <a:p>
             <a:pPr algn="ctr"/>
             <a:r>
-              <a:rPr lang="nl-NL" dirty="0" smtClean="0"/>
-              <a:t>B</a:t>
-            </a:r>
-            <a:endParaRPr lang="en-US" dirty="0"/>
-          </a:p>
-        </p:txBody>
-      </p:sp>
-      <p:sp>
-        <p:nvSpPr>
-          <p:cNvPr id="44" name="Rounded Rectangle 43"/>
+              <a:rPr lang="nl-NL" sz="1200" dirty="0" smtClean="0"/>
+              <a:t>Under </a:t>
+            </a:r>
+            <a:r>
+              <a:rPr lang="nl-NL" sz="1200" dirty="0" err="1" smtClean="0"/>
+              <a:t>Consideration</a:t>
+            </a:r>
+            <a:endParaRPr lang="en-US" sz="1200" dirty="0"/>
+          </a:p>
+        </p:txBody>
+      </p:sp>
+      <p:sp>
+        <p:nvSpPr>
+          <p:cNvPr id="12" name="Rounded Rectangle 11"/>
           <p:cNvSpPr/>
           <p:nvPr/>
         </p:nvSpPr>
         <p:spPr>
           <a:xfrm>
-            <a:off x="7704666" y="4504928"/>
-            <a:ext cx="432048" cy="387660"/>
+            <a:off x="179512" y="3691965"/>
+            <a:ext cx="1558030" cy="291745"/>
           </a:xfrm>
           <a:prstGeom prst="roundRect">
             <a:avLst/>
@@ -4024,16 +4013,58 @@
         </p:spPr>
         <p:style>
           <a:lnRef idx="1">
+            <a:schemeClr val="accent2"/>
+          </a:lnRef>
+          <a:fillRef idx="2">
+            <a:schemeClr val="accent2"/>
+          </a:fillRef>
+          <a:effectRef idx="1">
+            <a:schemeClr val="accent2"/>
+          </a:effectRef>
+          <a:fontRef idx="minor">
+            <a:schemeClr val="dk1"/>
+          </a:fontRef>
+        </p:style>
+        <p:txBody>
+          <a:bodyPr rtlCol="0" anchor="ctr"/>
+          <a:lstStyle/>
+          <a:p>
+            <a:pPr algn="ctr"/>
+            <a:r>
+              <a:rPr lang="nl-NL" sz="1600" dirty="0" err="1" smtClean="0"/>
+              <a:t>Rejected</a:t>
+            </a:r>
+            <a:endParaRPr lang="en-US" sz="1600" dirty="0"/>
+          </a:p>
+        </p:txBody>
+      </p:sp>
+      <p:sp>
+        <p:nvSpPr>
+          <p:cNvPr id="13" name="Rounded Rectangle 12"/>
+          <p:cNvSpPr/>
+          <p:nvPr/>
+        </p:nvSpPr>
+        <p:spPr>
+          <a:xfrm>
+            <a:off x="179512" y="4016602"/>
+            <a:ext cx="1558030" cy="291745"/>
+          </a:xfrm>
+          <a:prstGeom prst="roundRect">
+            <a:avLst/>
+          </a:prstGeom>
+        </p:spPr>
+        <p:style>
+          <a:lnRef idx="1">
             <a:schemeClr val="accent3"/>
           </a:lnRef>
-          <a:fillRef idx="3">
+          <a:fillRef idx="2">
             <a:schemeClr val="accent3"/>
           </a:fillRef>
-          <a:effectRef idx="2">
+          <a:effectRef idx="1">
             <a:schemeClr val="accent3"/>
           </a:effectRef>
           <a:fontRef idx="minor">
-            <a:schemeClr val="lt1"/>
+            <a:schemeClr val="dk1"/>
           </a:fontRef>
         </p:style>
         <p:txBody>
@@ -4042,8 +4073,100 @@
           <a:p>
             <a:pPr algn="ctr"/>
             <a:r>
+              <a:rPr lang="nl-NL" sz="1600" dirty="0" err="1" smtClean="0"/>
+              <a:t>Approved</a:t>
+            </a:r>
+            <a:endParaRPr lang="en-US" sz="1600" dirty="0"/>
+          </a:p>
+        </p:txBody>
+      </p:sp>
+      <p:sp>
+        <p:nvSpPr>
+          <p:cNvPr id="14" name="Rounded Rectangle 13"/>
+          <p:cNvSpPr/>
+          <p:nvPr/>
+        </p:nvSpPr>
+        <p:spPr>
+          <a:xfrm>
+            <a:off x="6304730" y="762847"/>
+            <a:ext cx="1357348" cy="291745"/>
+          </a:xfrm>
+          <a:prstGeom prst="roundRect">
+            <a:avLst/>
+          </a:prstGeom>
+        </p:spPr>
+        <p:style>
+          <a:lnRef idx="1">
+            <a:schemeClr val="accent3"/>
+          </a:lnRef>
+          <a:fillRef idx="2">
+            <a:schemeClr val="accent3"/>
+          </a:fillRef>
+          <a:effectRef idx="1">
+            <a:schemeClr val="accent3"/>
+          </a:effectRef>
+          <a:fontRef idx="minor">
+            <a:schemeClr val="dk1"/>
+          </a:fontRef>
+        </p:style>
+        <p:txBody>
+          <a:bodyPr rtlCol="0" anchor="ctr"/>
+          <a:lstStyle/>
+          <a:p>
+            <a:pPr algn="ctr"/>
+            <a:r>
+              <a:rPr lang="nl-NL" dirty="0" smtClean="0"/>
+              <a:t>In </a:t>
+            </a:r>
+            <a:r>
+              <a:rPr lang="nl-NL" dirty="0" err="1" smtClean="0"/>
+              <a:t>Process</a:t>
+            </a:r>
+            <a:endParaRPr lang="en-US" dirty="0"/>
+          </a:p>
+        </p:txBody>
+      </p:sp>
+      <p:sp>
+        <p:nvSpPr>
+          <p:cNvPr id="15" name="Rounded Rectangle 14"/>
+          <p:cNvSpPr/>
+          <p:nvPr/>
+        </p:nvSpPr>
+        <p:spPr>
+          <a:xfrm>
+            <a:off x="6758627" y="4257093"/>
+            <a:ext cx="1558030" cy="291745"/>
+          </a:xfrm>
+          <a:prstGeom prst="roundRect">
+            <a:avLst/>
+          </a:prstGeom>
+        </p:spPr>
+        <p:style>
+          <a:lnRef idx="1">
+            <a:schemeClr val="accent3"/>
+          </a:lnRef>
+          <a:fillRef idx="2">
+            <a:schemeClr val="accent3"/>
+          </a:fillRef>
+          <a:effectRef idx="1">
+            <a:schemeClr val="accent3"/>
+          </a:effectRef>
+          <a:fontRef idx="minor">
+            <a:schemeClr val="dk1"/>
+          </a:fontRef>
+        </p:style>
+        <p:txBody>
+          <a:bodyPr rtlCol="0" anchor="ctr"/>
+          <a:lstStyle/>
+          <a:p>
+            <a:pPr algn="ctr"/>
+            <a:r>
               <a:rPr lang="nl-NL" sz="1400" dirty="0" smtClean="0"/>
-              <a:t>T</a:t>
+              <a:t>Under </a:t>
+            </a:r>
+            <a:r>
+              <a:rPr lang="nl-NL" sz="1400" dirty="0" err="1" smtClean="0"/>
+              <a:t>negotiation</a:t>
             </a:r>
             <a:endParaRPr lang="en-US" sz="1400" dirty="0"/>
           </a:p>
@@ -4051,33 +4174,31 @@
       </p:sp>
       <p:sp>
         <p:nvSpPr>
-          <p:cNvPr id="45" name="Flowchart: Direct Access Storage 44"/>
+          <p:cNvPr id="16" name="Rounded Rectangle 15"/>
           <p:cNvSpPr/>
           <p:nvPr/>
         </p:nvSpPr>
         <p:spPr>
           <a:xfrm>
-            <a:off x="8208722" y="4566368"/>
-            <a:ext cx="288032" cy="360040"/>
-          </a:xfrm>
-          <a:prstGeom prst="flowChartMagneticDrum">
+            <a:off x="7537642" y="6450674"/>
+            <a:ext cx="1558030" cy="291745"/>
+          </a:xfrm>
+          <a:prstGeom prst="roundRect">
             <a:avLst/>
           </a:prstGeom>
         </p:spPr>
         <p:style>
-          <a:lnRef idx="2">
-            <a:schemeClr val="accent1">
-              <a:shade val="50000"/>
-            </a:schemeClr>
-          </a:lnRef>
-          <a:fillRef idx="1">
-            <a:schemeClr val="accent1"/>
-          </a:fillRef>
-          <a:effectRef idx="0">
-            <a:schemeClr val="accent1"/>
-          </a:effectRef>
-          <a:fontRef idx="minor">
-            <a:schemeClr val="lt1"/>
+          <a:lnRef idx="1">
+            <a:schemeClr val="accent2"/>
+          </a:lnRef>
+          <a:fillRef idx="2">
+            <a:schemeClr val="accent2"/>
+          </a:fillRef>
+          <a:effectRef idx="1">
+            <a:schemeClr val="accent2"/>
+          </a:effectRef>
+          <a:fontRef idx="minor">
+            <a:schemeClr val="dk1"/>
           </a:fontRef>
         </p:style>
         <p:txBody>
@@ -4085,110 +4206,91 @@
           <a:lstStyle/>
           <a:p>
             <a:pPr algn="ctr"/>
-            <a:endParaRPr lang="en-US"/>
-          </a:p>
-        </p:txBody>
-      </p:sp>
-      <p:cxnSp>
-        <p:nvCxnSpPr>
-          <p:cNvPr id="47" name="Elbow Connector 46"/>
-          <p:cNvCxnSpPr>
-            <a:stCxn id="45" idx="4"/>
-            <a:endCxn id="3" idx="4"/>
-          </p:cNvCxnSpPr>
-          <p:nvPr/>
-        </p:nvCxnSpPr>
-        <p:spPr>
-          <a:xfrm flipH="1" flipV="1">
-            <a:off x="6096382" y="3551021"/>
-            <a:ext cx="2400372" cy="1195367"/>
-          </a:xfrm>
-          <a:prstGeom prst="bentConnector3">
-            <a:avLst>
-              <a:gd name="adj1" fmla="val -9524"/>
-            </a:avLst>
-          </a:prstGeom>
-          <a:ln>
-            <a:tailEnd type="arrow"/>
-          </a:ln>
+            <a:r>
+              <a:rPr lang="nl-NL" sz="1400" dirty="0" err="1" smtClean="0"/>
+              <a:t>Not</a:t>
+            </a:r>
+            <a:r>
+              <a:rPr lang="nl-NL" sz="1400" dirty="0" smtClean="0"/>
+              <a:t> </a:t>
+            </a:r>
+            <a:r>
+              <a:rPr lang="nl-NL" sz="1400" dirty="0" err="1" smtClean="0"/>
+              <a:t>feasible</a:t>
+            </a:r>
+            <a:endParaRPr lang="en-US" sz="1400" dirty="0"/>
+          </a:p>
+        </p:txBody>
+      </p:sp>
+      <p:sp>
+        <p:nvSpPr>
+          <p:cNvPr id="17" name="Rounded Rectangle 16"/>
+          <p:cNvSpPr/>
+          <p:nvPr/>
+        </p:nvSpPr>
+        <p:spPr>
+          <a:xfrm>
+            <a:off x="179512" y="6233599"/>
+            <a:ext cx="1589346" cy="291745"/>
+          </a:xfrm>
+          <a:prstGeom prst="roundRect">
+            <a:avLst/>
+          </a:prstGeom>
         </p:spPr>
         <p:style>
           <a:lnRef idx="1">
-            <a:schemeClr val="accent1"/>
-          </a:lnRef>
-          <a:fillRef idx="0">
-            <a:schemeClr val="accent1"/>
-          </a:fillRef>
-          <a:effectRef idx="0">
-            <a:schemeClr val="accent1"/>
-          </a:effectRef>
-          <a:fontRef idx="minor">
-            <a:schemeClr val="tx1"/>
-          </a:fontRef>
-        </p:style>
-      </p:cxnSp>
-      <p:cxnSp>
-        <p:nvCxnSpPr>
-          <p:cNvPr id="49" name="Straight Arrow Connector 48"/>
-          <p:cNvCxnSpPr/>
-          <p:nvPr/>
-        </p:nvCxnSpPr>
-        <p:spPr>
-          <a:xfrm>
-            <a:off x="1043608" y="1991445"/>
-            <a:ext cx="1524382" cy="914126"/>
-          </a:xfrm>
-          <a:prstGeom prst="straightConnector1">
+            <a:schemeClr val="accent2"/>
+          </a:lnRef>
+          <a:fillRef idx="2">
+            <a:schemeClr val="accent2"/>
+          </a:fillRef>
+          <a:effectRef idx="1">
+            <a:schemeClr val="accent2"/>
+          </a:effectRef>
+          <a:fontRef idx="minor">
+            <a:schemeClr val="dk1"/>
+          </a:fontRef>
+        </p:style>
+        <p:txBody>
+          <a:bodyPr rtlCol="0" anchor="ctr"/>
+          <a:lstStyle/>
+          <a:p>
+            <a:pPr algn="ctr"/>
+            <a:r>
+              <a:rPr lang="nl-NL" sz="1400" dirty="0" smtClean="0"/>
+              <a:t>Closed</a:t>
+            </a:r>
+            <a:endParaRPr lang="en-US" sz="1400" dirty="0"/>
+          </a:p>
+        </p:txBody>
+      </p:sp>
+      <p:sp>
+        <p:nvSpPr>
+          <p:cNvPr id="18" name="Rounded Rectangle 17"/>
+          <p:cNvSpPr/>
+          <p:nvPr/>
+        </p:nvSpPr>
+        <p:spPr>
+          <a:xfrm>
+            <a:off x="179512" y="5877272"/>
+            <a:ext cx="1589346" cy="291745"/>
+          </a:xfrm>
+          <a:prstGeom prst="roundRect">
             <a:avLst/>
           </a:prstGeom>
-          <a:ln>
-            <a:tailEnd type="arrow"/>
-          </a:ln>
         </p:spPr>
         <p:style>
           <a:lnRef idx="1">
-            <a:schemeClr val="accent1"/>
-          </a:lnRef>
-          <a:fillRef idx="0">
-            <a:schemeClr val="accent1"/>
-          </a:fillRef>
-          <a:effectRef idx="0">
-            <a:schemeClr val="accent1"/>
-          </a:effectRef>
-          <a:fontRef idx="minor">
-            <a:schemeClr val="tx1"/>
-          </a:fontRef>
-        </p:style>
-      </p:cxnSp>
-      <p:sp>
-        <p:nvSpPr>
-          <p:cNvPr id="50" name="Rectangle 49"/>
-          <p:cNvSpPr/>
-          <p:nvPr/>
-        </p:nvSpPr>
-        <p:spPr>
-          <a:xfrm>
-            <a:off x="395536" y="1631405"/>
-            <a:ext cx="1080120" cy="360040"/>
-          </a:xfrm>
-          <a:prstGeom prst="rect">
-            <a:avLst/>
-          </a:prstGeom>
-        </p:spPr>
-        <p:style>
-          <a:lnRef idx="2">
-            <a:schemeClr val="accent1">
-              <a:shade val="50000"/>
-            </a:schemeClr>
-          </a:lnRef>
-          <a:fillRef idx="1">
-            <a:schemeClr val="accent1"/>
-          </a:fillRef>
-          <a:effectRef idx="0">
-            <a:schemeClr val="accent1"/>
-          </a:effectRef>
-          <a:fontRef idx="minor">
-            <a:schemeClr val="lt1"/>
+            <a:schemeClr val="accent2"/>
+          </a:lnRef>
+          <a:fillRef idx="2">
+            <a:schemeClr val="accent2"/>
+          </a:fillRef>
+          <a:effectRef idx="1">
+            <a:schemeClr val="accent2"/>
+          </a:effectRef>
+          <a:fontRef idx="minor">
+            <a:schemeClr val="dk1"/>
           </a:fontRef>
         </p:style>
         <p:txBody>
@@ -4197,57 +4299,17 @@
           <a:p>
             <a:pPr algn="ctr"/>
             <a:r>
-              <a:rPr lang="nl-NL" dirty="0" smtClean="0"/>
-              <a:t>SOAP</a:t>
-            </a:r>
-            <a:endParaRPr lang="en-US" dirty="0"/>
-          </a:p>
-        </p:txBody>
-      </p:sp>
-      <p:sp>
-        <p:nvSpPr>
-          <p:cNvPr id="66" name="Cube 65"/>
-          <p:cNvSpPr/>
-          <p:nvPr/>
-        </p:nvSpPr>
-        <p:spPr>
-          <a:xfrm>
-            <a:off x="2594993" y="2731054"/>
-            <a:ext cx="234026" cy="493050"/>
-          </a:xfrm>
-          <a:prstGeom prst="cube">
-            <a:avLst/>
-          </a:prstGeom>
-        </p:spPr>
-        <p:style>
-          <a:lnRef idx="2">
-            <a:schemeClr val="accent1">
-              <a:shade val="50000"/>
-            </a:schemeClr>
-          </a:lnRef>
-          <a:fillRef idx="1">
-            <a:schemeClr val="accent1"/>
-          </a:fillRef>
-          <a:effectRef idx="0">
-            <a:schemeClr val="accent1"/>
-          </a:effectRef>
-          <a:fontRef idx="minor">
-            <a:schemeClr val="lt1"/>
-          </a:fontRef>
-        </p:style>
-        <p:txBody>
-          <a:bodyPr rtlCol="0" anchor="ctr"/>
-          <a:lstStyle/>
-          <a:p>
-            <a:pPr algn="ctr"/>
-            <a:endParaRPr lang="en-US"/>
+              <a:rPr lang="nl-NL" sz="1400" dirty="0" smtClean="0"/>
+              <a:t>Engagement</a:t>
+            </a:r>
+            <a:endParaRPr lang="en-US" sz="1400" dirty="0"/>
           </a:p>
         </p:txBody>
       </p:sp>
     </p:spTree>
     <p:extLst>
       <p:ext uri="{BB962C8B-B14F-4D97-AF65-F5344CB8AC3E}">
-        <p14:creationId xmlns:p14="http://schemas.microsoft.com/office/powerpoint/2010/main" val="257956599"/>
+        <p14:creationId xmlns:p14="http://schemas.microsoft.com/office/powerpoint/2010/main" val="2671241409"/>
       </p:ext>
     </p:extLst>
   </p:cSld>
@@ -4274,64 +4336,1155 @@
           <a:chExt cx="0" cy="0"/>
         </a:xfrm>
       </p:grpSpPr>
-      <p:pic>
-        <p:nvPicPr>
-          <p:cNvPr id="1026" name="Picture 2"/>
-          <p:cNvPicPr>
-            <a:picLocks noChangeAspect="1" noChangeArrowheads="1"/>
-          </p:cNvPicPr>
-          <p:nvPr/>
-        </p:nvPicPr>
-        <p:blipFill>
-          <a:blip r:embed="rId2">
-            <a:extLst>
-              <a:ext uri="{28A0092B-C50C-407E-A947-70E740481C1C}">
-                <a14:useLocalDpi xmlns:a14="http://schemas.microsoft.com/office/drawing/2010/main" val="0"/>
-              </a:ext>
-            </a:extLst>
-          </a:blip>
-          <a:srcRect/>
-          <a:stretch>
-            <a:fillRect/>
-          </a:stretch>
-        </p:blipFill>
-        <p:spPr bwMode="auto">
-          <a:xfrm>
-            <a:off x="660400" y="536575"/>
-            <a:ext cx="7823200" cy="5784850"/>
+      <p:sp>
+        <p:nvSpPr>
+          <p:cNvPr id="2" name="Rounded Rectangle 1"/>
+          <p:cNvSpPr/>
+          <p:nvPr/>
+        </p:nvSpPr>
+        <p:spPr>
+          <a:xfrm>
+            <a:off x="2712006" y="2185491"/>
+            <a:ext cx="1584176" cy="1584176"/>
+          </a:xfrm>
+          <a:prstGeom prst="roundRect">
+            <a:avLst/>
+          </a:prstGeom>
+        </p:spPr>
+        <p:style>
+          <a:lnRef idx="2">
+            <a:schemeClr val="accent1">
+              <a:shade val="50000"/>
+            </a:schemeClr>
+          </a:lnRef>
+          <a:fillRef idx="1">
+            <a:schemeClr val="accent1"/>
+          </a:fillRef>
+          <a:effectRef idx="0">
+            <a:schemeClr val="accent1"/>
+          </a:effectRef>
+          <a:fontRef idx="minor">
+            <a:schemeClr val="lt1"/>
+          </a:fontRef>
+        </p:style>
+        <p:txBody>
+          <a:bodyPr rtlCol="0" anchor="ctr"/>
+          <a:lstStyle/>
+          <a:p>
+            <a:pPr algn="ctr"/>
+            <a:r>
+              <a:rPr lang="nl-NL" dirty="0" smtClean="0"/>
+              <a:t>SOA </a:t>
+            </a:r>
+            <a:r>
+              <a:rPr lang="nl-NL" dirty="0" err="1" smtClean="0"/>
+              <a:t>Composite</a:t>
+            </a:r>
+            <a:endParaRPr lang="nl-NL" dirty="0" smtClean="0"/>
+          </a:p>
+          <a:p>
+            <a:pPr algn="ctr"/>
+            <a:endParaRPr lang="nl-NL" dirty="0"/>
+          </a:p>
+          <a:p>
+            <a:pPr algn="ctr"/>
+            <a:endParaRPr lang="nl-NL" dirty="0" smtClean="0"/>
+          </a:p>
+          <a:p>
+            <a:pPr algn="ctr"/>
+            <a:endParaRPr lang="en-US" dirty="0"/>
+          </a:p>
+        </p:txBody>
+      </p:sp>
+      <p:sp>
+        <p:nvSpPr>
+          <p:cNvPr id="3" name="Flowchart: Magnetic Disk 2"/>
+          <p:cNvSpPr/>
+          <p:nvPr/>
+        </p:nvSpPr>
+        <p:spPr>
+          <a:xfrm>
+            <a:off x="4944254" y="2974957"/>
+            <a:ext cx="1152128" cy="1152128"/>
+          </a:xfrm>
+          <a:prstGeom prst="flowChartMagneticDisk">
+            <a:avLst/>
+          </a:prstGeom>
+        </p:spPr>
+        <p:style>
+          <a:lnRef idx="1">
+            <a:schemeClr val="accent2"/>
+          </a:lnRef>
+          <a:fillRef idx="2">
+            <a:schemeClr val="accent2"/>
+          </a:fillRef>
+          <a:effectRef idx="1">
+            <a:schemeClr val="accent2"/>
+          </a:effectRef>
+          <a:fontRef idx="minor">
+            <a:schemeClr val="dk1"/>
+          </a:fontRef>
+        </p:style>
+        <p:txBody>
+          <a:bodyPr rtlCol="0" anchor="ctr"/>
+          <a:lstStyle/>
+          <a:p>
+            <a:pPr algn="ctr"/>
+            <a:endParaRPr lang="en-US"/>
+          </a:p>
+        </p:txBody>
+      </p:sp>
+      <p:sp>
+        <p:nvSpPr>
+          <p:cNvPr id="4" name="Flowchart: Direct Access Storage 3"/>
+          <p:cNvSpPr/>
+          <p:nvPr/>
+        </p:nvSpPr>
+        <p:spPr>
+          <a:xfrm>
+            <a:off x="4152166" y="2905571"/>
+            <a:ext cx="288032" cy="360040"/>
+          </a:xfrm>
+          <a:prstGeom prst="flowChartMagneticDrum">
+            <a:avLst/>
+          </a:prstGeom>
+        </p:spPr>
+        <p:style>
+          <a:lnRef idx="2">
+            <a:schemeClr val="accent1">
+              <a:shade val="50000"/>
+            </a:schemeClr>
+          </a:lnRef>
+          <a:fillRef idx="1">
+            <a:schemeClr val="accent1"/>
+          </a:fillRef>
+          <a:effectRef idx="0">
+            <a:schemeClr val="accent1"/>
+          </a:effectRef>
+          <a:fontRef idx="minor">
+            <a:schemeClr val="lt1"/>
+          </a:fontRef>
+        </p:style>
+        <p:txBody>
+          <a:bodyPr rtlCol="0" anchor="ctr"/>
+          <a:lstStyle/>
+          <a:p>
+            <a:pPr algn="ctr"/>
+            <a:endParaRPr lang="en-US"/>
+          </a:p>
+        </p:txBody>
+      </p:sp>
+      <p:cxnSp>
+        <p:nvCxnSpPr>
+          <p:cNvPr id="10" name="Elbow Connector 9"/>
+          <p:cNvCxnSpPr>
+            <a:stCxn id="4" idx="4"/>
+            <a:endCxn id="3" idx="2"/>
+          </p:cNvCxnSpPr>
+          <p:nvPr/>
+        </p:nvCxnSpPr>
+        <p:spPr>
+          <a:xfrm>
+            <a:off x="4440198" y="3085591"/>
+            <a:ext cx="504056" cy="465430"/>
+          </a:xfrm>
+          <a:prstGeom prst="bentConnector3">
+            <a:avLst/>
+          </a:prstGeom>
+          <a:ln>
+            <a:tailEnd type="arrow"/>
+          </a:ln>
+        </p:spPr>
+        <p:style>
+          <a:lnRef idx="1">
+            <a:schemeClr val="accent1"/>
+          </a:lnRef>
+          <a:fillRef idx="0">
+            <a:schemeClr val="accent1"/>
+          </a:fillRef>
+          <a:effectRef idx="0">
+            <a:schemeClr val="accent1"/>
+          </a:effectRef>
+          <a:fontRef idx="minor">
+            <a:schemeClr val="tx1"/>
+          </a:fontRef>
+        </p:style>
+      </p:cxnSp>
+      <p:sp>
+        <p:nvSpPr>
+          <p:cNvPr id="11" name="Rounded Rectangle 10"/>
+          <p:cNvSpPr/>
+          <p:nvPr/>
+        </p:nvSpPr>
+        <p:spPr>
+          <a:xfrm>
+            <a:off x="5112378" y="919709"/>
+            <a:ext cx="1584176" cy="1584176"/>
+          </a:xfrm>
+          <a:prstGeom prst="roundRect">
+            <a:avLst/>
+          </a:prstGeom>
+        </p:spPr>
+        <p:style>
+          <a:lnRef idx="2">
+            <a:schemeClr val="accent1">
+              <a:shade val="50000"/>
+            </a:schemeClr>
+          </a:lnRef>
+          <a:fillRef idx="1">
+            <a:schemeClr val="accent1"/>
+          </a:fillRef>
+          <a:effectRef idx="0">
+            <a:schemeClr val="accent1"/>
+          </a:effectRef>
+          <a:fontRef idx="minor">
+            <a:schemeClr val="lt1"/>
+          </a:fontRef>
+        </p:style>
+        <p:txBody>
+          <a:bodyPr rtlCol="0" anchor="ctr"/>
+          <a:lstStyle/>
+          <a:p>
+            <a:pPr algn="ctr"/>
+            <a:r>
+              <a:rPr lang="nl-NL" dirty="0" smtClean="0"/>
+              <a:t>SOA </a:t>
+            </a:r>
+            <a:r>
+              <a:rPr lang="nl-NL" dirty="0" err="1" smtClean="0"/>
+              <a:t>Composite</a:t>
+            </a:r>
+            <a:endParaRPr lang="nl-NL" dirty="0" smtClean="0"/>
+          </a:p>
+          <a:p>
+            <a:pPr algn="ctr"/>
+            <a:endParaRPr lang="nl-NL" dirty="0"/>
+          </a:p>
+          <a:p>
+            <a:pPr algn="ctr"/>
+            <a:endParaRPr lang="nl-NL" dirty="0" smtClean="0"/>
+          </a:p>
+          <a:p>
+            <a:pPr algn="ctr"/>
+            <a:endParaRPr lang="en-US" dirty="0"/>
+          </a:p>
+        </p:txBody>
+      </p:sp>
+      <p:sp>
+        <p:nvSpPr>
+          <p:cNvPr id="13" name="Flowchart: Direct Access Storage 12"/>
+          <p:cNvSpPr/>
+          <p:nvPr/>
+        </p:nvSpPr>
+        <p:spPr>
+          <a:xfrm>
+            <a:off x="4968362" y="1567781"/>
+            <a:ext cx="288032" cy="360040"/>
+          </a:xfrm>
+          <a:prstGeom prst="flowChartMagneticDrum">
+            <a:avLst/>
+          </a:prstGeom>
+        </p:spPr>
+        <p:style>
+          <a:lnRef idx="2">
+            <a:schemeClr val="accent1">
+              <a:shade val="50000"/>
+            </a:schemeClr>
+          </a:lnRef>
+          <a:fillRef idx="1">
+            <a:schemeClr val="accent1"/>
+          </a:fillRef>
+          <a:effectRef idx="0">
+            <a:schemeClr val="accent1"/>
+          </a:effectRef>
+          <a:fontRef idx="minor">
+            <a:schemeClr val="lt1"/>
+          </a:fontRef>
+        </p:style>
+        <p:txBody>
+          <a:bodyPr rtlCol="0" anchor="ctr"/>
+          <a:lstStyle/>
+          <a:p>
+            <a:pPr algn="ctr"/>
+            <a:endParaRPr lang="en-US"/>
+          </a:p>
+        </p:txBody>
+      </p:sp>
+      <p:sp>
+        <p:nvSpPr>
+          <p:cNvPr id="15" name="Rectangular Callout 14"/>
+          <p:cNvSpPr/>
+          <p:nvPr/>
+        </p:nvSpPr>
+        <p:spPr>
+          <a:xfrm>
+            <a:off x="1800010" y="1393403"/>
+            <a:ext cx="1823991" cy="436240"/>
+          </a:xfrm>
+          <a:prstGeom prst="wedgeRectCallout">
+            <a:avLst>
+              <a:gd name="adj1" fmla="val 9496"/>
+              <a:gd name="adj2" fmla="val 156081"/>
+            </a:avLst>
+          </a:prstGeom>
+        </p:spPr>
+        <p:style>
+          <a:lnRef idx="1">
+            <a:schemeClr val="accent6"/>
+          </a:lnRef>
+          <a:fillRef idx="3">
+            <a:schemeClr val="accent6"/>
+          </a:fillRef>
+          <a:effectRef idx="2">
+            <a:schemeClr val="accent6"/>
+          </a:effectRef>
+          <a:fontRef idx="minor">
+            <a:schemeClr val="lt1"/>
+          </a:fontRef>
+        </p:style>
+        <p:txBody>
+          <a:bodyPr rtlCol="0" anchor="ctr"/>
+          <a:lstStyle/>
+          <a:p>
+            <a:pPr algn="ctr"/>
+            <a:r>
+              <a:rPr lang="nl-NL" sz="1400" dirty="0" err="1" smtClean="0"/>
+              <a:t>SendInArtistProposal</a:t>
+            </a:r>
+            <a:endParaRPr lang="en-US" sz="1400" dirty="0"/>
+          </a:p>
+        </p:txBody>
+      </p:sp>
+      <p:sp>
+        <p:nvSpPr>
+          <p:cNvPr id="16" name="Rectangular Callout 15"/>
+          <p:cNvSpPr/>
+          <p:nvPr/>
+        </p:nvSpPr>
+        <p:spPr>
+          <a:xfrm>
+            <a:off x="6180602" y="616496"/>
+            <a:ext cx="1823991" cy="436240"/>
+          </a:xfrm>
+          <a:prstGeom prst="wedgeRectCallout">
+            <a:avLst>
+              <a:gd name="adj1" fmla="val -37356"/>
+              <a:gd name="adj2" fmla="val 101230"/>
+            </a:avLst>
+          </a:prstGeom>
+        </p:spPr>
+        <p:style>
+          <a:lnRef idx="1">
+            <a:schemeClr val="accent6"/>
+          </a:lnRef>
+          <a:fillRef idx="3">
+            <a:schemeClr val="accent6"/>
+          </a:fillRef>
+          <a:effectRef idx="2">
+            <a:schemeClr val="accent6"/>
+          </a:effectRef>
+          <a:fontRef idx="minor">
+            <a:schemeClr val="lt1"/>
+          </a:fontRef>
+        </p:style>
+        <p:txBody>
+          <a:bodyPr rtlCol="0" anchor="ctr"/>
+          <a:lstStyle/>
+          <a:p>
+            <a:pPr algn="ctr"/>
+            <a:r>
+              <a:rPr lang="nl-NL" sz="1400" dirty="0" err="1" smtClean="0"/>
+              <a:t>EvaluateArtistProposal</a:t>
+            </a:r>
+            <a:endParaRPr lang="en-US" sz="1400" dirty="0"/>
+          </a:p>
+        </p:txBody>
+      </p:sp>
+      <p:cxnSp>
+        <p:nvCxnSpPr>
+          <p:cNvPr id="18" name="Elbow Connector 17"/>
+          <p:cNvCxnSpPr>
+            <a:stCxn id="3" idx="1"/>
+            <a:endCxn id="13" idx="1"/>
+          </p:cNvCxnSpPr>
+          <p:nvPr/>
+        </p:nvCxnSpPr>
+        <p:spPr>
+          <a:xfrm rot="16200000" flipV="1">
+            <a:off x="4630762" y="2085401"/>
+            <a:ext cx="1227156" cy="551956"/>
+          </a:xfrm>
+          <a:prstGeom prst="bentConnector4">
+            <a:avLst>
+              <a:gd name="adj1" fmla="val 22470"/>
+              <a:gd name="adj2" fmla="val 145784"/>
+            </a:avLst>
+          </a:prstGeom>
+          <a:ln>
+            <a:tailEnd type="arrow"/>
+          </a:ln>
+        </p:spPr>
+        <p:style>
+          <a:lnRef idx="1">
+            <a:schemeClr val="accent1"/>
+          </a:lnRef>
+          <a:fillRef idx="0">
+            <a:schemeClr val="accent1"/>
+          </a:fillRef>
+          <a:effectRef idx="0">
+            <a:schemeClr val="accent1"/>
+          </a:effectRef>
+          <a:fontRef idx="minor">
+            <a:schemeClr val="tx1"/>
+          </a:fontRef>
+        </p:style>
+      </p:cxnSp>
+      <p:sp>
+        <p:nvSpPr>
+          <p:cNvPr id="24" name="Rounded Rectangle 23"/>
+          <p:cNvSpPr/>
+          <p:nvPr/>
+        </p:nvSpPr>
+        <p:spPr>
+          <a:xfrm>
+            <a:off x="6732559" y="3712840"/>
+            <a:ext cx="1584176" cy="1584176"/>
+          </a:xfrm>
+          <a:prstGeom prst="roundRect">
+            <a:avLst/>
+          </a:prstGeom>
+        </p:spPr>
+        <p:style>
+          <a:lnRef idx="2">
+            <a:schemeClr val="accent1">
+              <a:shade val="50000"/>
+            </a:schemeClr>
+          </a:lnRef>
+          <a:fillRef idx="1">
+            <a:schemeClr val="accent1"/>
+          </a:fillRef>
+          <a:effectRef idx="0">
+            <a:schemeClr val="accent1"/>
+          </a:effectRef>
+          <a:fontRef idx="minor">
+            <a:schemeClr val="lt1"/>
+          </a:fontRef>
+        </p:style>
+        <p:txBody>
+          <a:bodyPr rtlCol="0" anchor="ctr"/>
+          <a:lstStyle/>
+          <a:p>
+            <a:pPr algn="ctr"/>
+            <a:r>
+              <a:rPr lang="nl-NL" dirty="0" smtClean="0"/>
+              <a:t>SOA </a:t>
+            </a:r>
+            <a:r>
+              <a:rPr lang="nl-NL" dirty="0" err="1" smtClean="0"/>
+              <a:t>Composite</a:t>
+            </a:r>
+            <a:endParaRPr lang="nl-NL" dirty="0" smtClean="0"/>
+          </a:p>
+          <a:p>
+            <a:pPr algn="ctr"/>
+            <a:endParaRPr lang="nl-NL" dirty="0"/>
+          </a:p>
+          <a:p>
+            <a:pPr algn="ctr"/>
+            <a:endParaRPr lang="nl-NL" dirty="0" smtClean="0"/>
+          </a:p>
+          <a:p>
+            <a:pPr algn="ctr"/>
+            <a:endParaRPr lang="en-US" dirty="0"/>
+          </a:p>
+        </p:txBody>
+      </p:sp>
+      <p:sp>
+        <p:nvSpPr>
+          <p:cNvPr id="25" name="Flowchart: Direct Access Storage 24"/>
+          <p:cNvSpPr/>
+          <p:nvPr/>
+        </p:nvSpPr>
+        <p:spPr>
+          <a:xfrm>
+            <a:off x="6588543" y="4561755"/>
+            <a:ext cx="288032" cy="360040"/>
+          </a:xfrm>
+          <a:prstGeom prst="flowChartMagneticDrum">
+            <a:avLst/>
+          </a:prstGeom>
+        </p:spPr>
+        <p:style>
+          <a:lnRef idx="2">
+            <a:schemeClr val="accent1">
+              <a:shade val="50000"/>
+            </a:schemeClr>
+          </a:lnRef>
+          <a:fillRef idx="1">
+            <a:schemeClr val="accent1"/>
+          </a:fillRef>
+          <a:effectRef idx="0">
+            <a:schemeClr val="accent1"/>
+          </a:effectRef>
+          <a:fontRef idx="minor">
+            <a:schemeClr val="lt1"/>
+          </a:fontRef>
+        </p:style>
+        <p:txBody>
+          <a:bodyPr rtlCol="0" anchor="ctr"/>
+          <a:lstStyle/>
+          <a:p>
+            <a:pPr algn="ctr"/>
+            <a:endParaRPr lang="en-US"/>
+          </a:p>
+        </p:txBody>
+      </p:sp>
+      <p:sp>
+        <p:nvSpPr>
+          <p:cNvPr id="26" name="Rectangular Callout 25"/>
+          <p:cNvSpPr/>
+          <p:nvPr/>
+        </p:nvSpPr>
+        <p:spPr>
+          <a:xfrm>
+            <a:off x="7164288" y="5657056"/>
+            <a:ext cx="1823991" cy="436240"/>
+          </a:xfrm>
+          <a:prstGeom prst="wedgeRectCallout">
+            <a:avLst>
+              <a:gd name="adj1" fmla="val -15335"/>
+              <a:gd name="adj2" fmla="val -157354"/>
+            </a:avLst>
+          </a:prstGeom>
+        </p:spPr>
+        <p:style>
+          <a:lnRef idx="1">
+            <a:schemeClr val="accent6"/>
+          </a:lnRef>
+          <a:fillRef idx="3">
+            <a:schemeClr val="accent6"/>
+          </a:fillRef>
+          <a:effectRef idx="2">
+            <a:schemeClr val="accent6"/>
+          </a:effectRef>
+          <a:fontRef idx="minor">
+            <a:schemeClr val="lt1"/>
+          </a:fontRef>
+        </p:style>
+        <p:txBody>
+          <a:bodyPr rtlCol="0" anchor="ctr"/>
+          <a:lstStyle/>
+          <a:p>
+            <a:pPr algn="ctr"/>
+            <a:r>
+              <a:rPr lang="nl-NL" sz="1400" dirty="0" err="1" smtClean="0"/>
+              <a:t>JudgeArtistProposal</a:t>
+            </a:r>
+            <a:endParaRPr lang="en-US" sz="1400" dirty="0"/>
+          </a:p>
+        </p:txBody>
+      </p:sp>
+      <p:cxnSp>
+        <p:nvCxnSpPr>
+          <p:cNvPr id="27" name="Elbow Connector 26"/>
+          <p:cNvCxnSpPr>
+            <a:endCxn id="25" idx="1"/>
+          </p:cNvCxnSpPr>
+          <p:nvPr/>
+        </p:nvCxnSpPr>
+        <p:spPr>
+          <a:xfrm>
+            <a:off x="6096382" y="3751864"/>
+            <a:ext cx="492161" cy="989911"/>
+          </a:xfrm>
+          <a:prstGeom prst="bentConnector3">
+            <a:avLst/>
+          </a:prstGeom>
+          <a:ln>
+            <a:tailEnd type="arrow"/>
+          </a:ln>
+        </p:spPr>
+        <p:style>
+          <a:lnRef idx="1">
+            <a:schemeClr val="accent1"/>
+          </a:lnRef>
+          <a:fillRef idx="0">
+            <a:schemeClr val="accent1"/>
+          </a:fillRef>
+          <a:effectRef idx="0">
+            <a:schemeClr val="accent1"/>
+          </a:effectRef>
+          <a:fontRef idx="minor">
+            <a:schemeClr val="tx1"/>
+          </a:fontRef>
+        </p:style>
+      </p:cxnSp>
+      <p:sp>
+        <p:nvSpPr>
+          <p:cNvPr id="29" name="Rounded Rectangle 28"/>
+          <p:cNvSpPr/>
+          <p:nvPr/>
+        </p:nvSpPr>
+        <p:spPr>
+          <a:xfrm>
+            <a:off x="3180058" y="2974957"/>
+            <a:ext cx="648072" cy="351656"/>
+          </a:xfrm>
+          <a:prstGeom prst="roundRect">
+            <a:avLst/>
+          </a:prstGeom>
+        </p:spPr>
+        <p:style>
+          <a:lnRef idx="1">
+            <a:schemeClr val="accent4"/>
+          </a:lnRef>
+          <a:fillRef idx="2">
+            <a:schemeClr val="accent4"/>
+          </a:fillRef>
+          <a:effectRef idx="1">
+            <a:schemeClr val="accent4"/>
+          </a:effectRef>
+          <a:fontRef idx="minor">
+            <a:schemeClr val="dk1"/>
+          </a:fontRef>
+        </p:style>
+        <p:txBody>
+          <a:bodyPr rtlCol="0" anchor="ctr"/>
+          <a:lstStyle/>
+          <a:p>
+            <a:pPr algn="ctr"/>
+            <a:r>
+              <a:rPr lang="nl-NL" dirty="0" smtClean="0"/>
+              <a:t>M</a:t>
+            </a:r>
+            <a:endParaRPr lang="en-US" dirty="0"/>
+          </a:p>
+        </p:txBody>
+      </p:sp>
+      <p:cxnSp>
+        <p:nvCxnSpPr>
+          <p:cNvPr id="31" name="Elbow Connector 30"/>
+          <p:cNvCxnSpPr>
+            <a:endCxn id="29" idx="1"/>
+          </p:cNvCxnSpPr>
+          <p:nvPr/>
+        </p:nvCxnSpPr>
+        <p:spPr>
+          <a:xfrm>
+            <a:off x="2856022" y="3013583"/>
+            <a:ext cx="324036" cy="137202"/>
+          </a:xfrm>
+          <a:prstGeom prst="bentConnector3">
+            <a:avLst/>
+          </a:prstGeom>
+          <a:ln>
+            <a:solidFill>
+              <a:schemeClr val="tx2">
+                <a:lumMod val="50000"/>
+              </a:schemeClr>
+            </a:solidFill>
+          </a:ln>
+        </p:spPr>
+        <p:style>
+          <a:lnRef idx="1">
+            <a:schemeClr val="accent1"/>
+          </a:lnRef>
+          <a:fillRef idx="0">
+            <a:schemeClr val="accent1"/>
+          </a:fillRef>
+          <a:effectRef idx="0">
+            <a:schemeClr val="accent1"/>
+          </a:effectRef>
+          <a:fontRef idx="minor">
+            <a:schemeClr val="tx1"/>
+          </a:fontRef>
+        </p:style>
+      </p:cxnSp>
+      <p:cxnSp>
+        <p:nvCxnSpPr>
+          <p:cNvPr id="33" name="Elbow Connector 32"/>
+          <p:cNvCxnSpPr>
+            <a:stCxn id="29" idx="3"/>
+            <a:endCxn id="4" idx="1"/>
+          </p:cNvCxnSpPr>
+          <p:nvPr/>
+        </p:nvCxnSpPr>
+        <p:spPr>
+          <a:xfrm flipV="1">
+            <a:off x="3828130" y="3085591"/>
+            <a:ext cx="324036" cy="65194"/>
+          </a:xfrm>
+          <a:prstGeom prst="bentConnector3">
+            <a:avLst/>
+          </a:prstGeom>
+          <a:ln>
+            <a:solidFill>
+              <a:schemeClr val="tx2">
+                <a:lumMod val="50000"/>
+              </a:schemeClr>
+            </a:solidFill>
+          </a:ln>
+        </p:spPr>
+        <p:style>
+          <a:lnRef idx="1">
+            <a:schemeClr val="accent1"/>
+          </a:lnRef>
+          <a:fillRef idx="0">
+            <a:schemeClr val="accent1"/>
+          </a:fillRef>
+          <a:effectRef idx="0">
+            <a:schemeClr val="accent1"/>
+          </a:effectRef>
+          <a:fontRef idx="minor">
+            <a:schemeClr val="tx1"/>
+          </a:fontRef>
+        </p:style>
+      </p:cxnSp>
+      <p:sp>
+        <p:nvSpPr>
+          <p:cNvPr id="34" name="Rounded Rectangle 33"/>
+          <p:cNvSpPr/>
+          <p:nvPr/>
+        </p:nvSpPr>
+        <p:spPr>
+          <a:xfrm>
+            <a:off x="5400410" y="1819809"/>
+            <a:ext cx="432048" cy="387660"/>
+          </a:xfrm>
+          <a:prstGeom prst="roundRect">
+            <a:avLst/>
+          </a:prstGeom>
+        </p:spPr>
+        <p:style>
+          <a:lnRef idx="1">
+            <a:schemeClr val="accent1"/>
+          </a:lnRef>
+          <a:fillRef idx="2">
+            <a:schemeClr val="accent1"/>
+          </a:fillRef>
+          <a:effectRef idx="1">
+            <a:schemeClr val="accent1"/>
+          </a:effectRef>
+          <a:fontRef idx="minor">
+            <a:schemeClr val="dk1"/>
+          </a:fontRef>
+        </p:style>
+        <p:txBody>
+          <a:bodyPr rtlCol="0" anchor="ctr"/>
+          <a:lstStyle/>
+          <a:p>
+            <a:pPr algn="ctr"/>
+            <a:r>
+              <a:rPr lang="nl-NL" dirty="0" smtClean="0"/>
+              <a:t>B</a:t>
+            </a:r>
+            <a:endParaRPr lang="en-US" dirty="0"/>
+          </a:p>
+        </p:txBody>
+      </p:sp>
+      <p:sp>
+        <p:nvSpPr>
+          <p:cNvPr id="35" name="Rounded Rectangle 34"/>
+          <p:cNvSpPr/>
+          <p:nvPr/>
+        </p:nvSpPr>
+        <p:spPr>
+          <a:xfrm>
+            <a:off x="6096699" y="1631405"/>
+            <a:ext cx="432048" cy="387660"/>
+          </a:xfrm>
+          <a:prstGeom prst="roundRect">
+            <a:avLst/>
+          </a:prstGeom>
+        </p:spPr>
+        <p:style>
+          <a:lnRef idx="1">
+            <a:schemeClr val="accent6"/>
+          </a:lnRef>
+          <a:fillRef idx="3">
+            <a:schemeClr val="accent6"/>
+          </a:fillRef>
+          <a:effectRef idx="2">
+            <a:schemeClr val="accent6"/>
+          </a:effectRef>
+          <a:fontRef idx="minor">
+            <a:schemeClr val="lt1"/>
+          </a:fontRef>
+        </p:style>
+        <p:txBody>
+          <a:bodyPr rtlCol="0" anchor="ctr"/>
+          <a:lstStyle/>
+          <a:p>
+            <a:pPr algn="ctr"/>
+            <a:r>
+              <a:rPr lang="nl-NL" sz="1400" dirty="0" smtClean="0"/>
+              <a:t>BR</a:t>
+            </a:r>
+            <a:endParaRPr lang="en-US" sz="1400" dirty="0"/>
+          </a:p>
+        </p:txBody>
+      </p:sp>
+      <p:sp>
+        <p:nvSpPr>
+          <p:cNvPr id="36" name="Flowchart: Direct Access Storage 35"/>
+          <p:cNvSpPr/>
+          <p:nvPr/>
+        </p:nvSpPr>
+        <p:spPr>
+          <a:xfrm>
+            <a:off x="6624546" y="1631405"/>
+            <a:ext cx="288032" cy="360040"/>
+          </a:xfrm>
+          <a:prstGeom prst="flowChartMagneticDrum">
+            <a:avLst/>
+          </a:prstGeom>
+        </p:spPr>
+        <p:style>
+          <a:lnRef idx="2">
+            <a:schemeClr val="accent1">
+              <a:shade val="50000"/>
+            </a:schemeClr>
+          </a:lnRef>
+          <a:fillRef idx="1">
+            <a:schemeClr val="accent1"/>
+          </a:fillRef>
+          <a:effectRef idx="0">
+            <a:schemeClr val="accent1"/>
+          </a:effectRef>
+          <a:fontRef idx="minor">
+            <a:schemeClr val="lt1"/>
+          </a:fontRef>
+        </p:style>
+        <p:txBody>
+          <a:bodyPr rtlCol="0" anchor="ctr"/>
+          <a:lstStyle/>
+          <a:p>
+            <a:pPr algn="ctr"/>
+            <a:endParaRPr lang="en-US"/>
+          </a:p>
+        </p:txBody>
+      </p:sp>
+      <p:cxnSp>
+        <p:nvCxnSpPr>
+          <p:cNvPr id="41" name="Elbow Connector 40"/>
+          <p:cNvCxnSpPr>
+            <a:stCxn id="36" idx="4"/>
+          </p:cNvCxnSpPr>
+          <p:nvPr/>
+        </p:nvCxnSpPr>
+        <p:spPr>
+          <a:xfrm flipH="1">
+            <a:off x="5832458" y="1811425"/>
+            <a:ext cx="1080120" cy="1382178"/>
+          </a:xfrm>
+          <a:prstGeom prst="bentConnector4">
+            <a:avLst>
+              <a:gd name="adj1" fmla="val -21164"/>
+              <a:gd name="adj2" fmla="val 65786"/>
+            </a:avLst>
+          </a:prstGeom>
+          <a:ln>
+            <a:tailEnd type="arrow"/>
+          </a:ln>
+        </p:spPr>
+        <p:style>
+          <a:lnRef idx="1">
+            <a:schemeClr val="accent1"/>
+          </a:lnRef>
+          <a:fillRef idx="0">
+            <a:schemeClr val="accent1"/>
+          </a:fillRef>
+          <a:effectRef idx="0">
+            <a:schemeClr val="accent1"/>
+          </a:effectRef>
+          <a:fontRef idx="minor">
+            <a:schemeClr val="tx1"/>
+          </a:fontRef>
+        </p:style>
+      </p:cxnSp>
+      <p:sp>
+        <p:nvSpPr>
+          <p:cNvPr id="43" name="Rounded Rectangle 42"/>
+          <p:cNvSpPr/>
+          <p:nvPr/>
+        </p:nvSpPr>
+        <p:spPr>
+          <a:xfrm>
+            <a:off x="7008377" y="4693332"/>
+            <a:ext cx="432048" cy="387660"/>
+          </a:xfrm>
+          <a:prstGeom prst="roundRect">
+            <a:avLst/>
+          </a:prstGeom>
+        </p:spPr>
+        <p:style>
+          <a:lnRef idx="1">
+            <a:schemeClr val="accent1"/>
+          </a:lnRef>
+          <a:fillRef idx="2">
+            <a:schemeClr val="accent1"/>
+          </a:fillRef>
+          <a:effectRef idx="1">
+            <a:schemeClr val="accent1"/>
+          </a:effectRef>
+          <a:fontRef idx="minor">
+            <a:schemeClr val="dk1"/>
+          </a:fontRef>
+        </p:style>
+        <p:txBody>
+          <a:bodyPr rtlCol="0" anchor="ctr"/>
+          <a:lstStyle/>
+          <a:p>
+            <a:pPr algn="ctr"/>
+            <a:r>
+              <a:rPr lang="nl-NL" dirty="0" smtClean="0"/>
+              <a:t>B</a:t>
+            </a:r>
+            <a:endParaRPr lang="en-US" dirty="0"/>
+          </a:p>
+        </p:txBody>
+      </p:sp>
+      <p:sp>
+        <p:nvSpPr>
+          <p:cNvPr id="44" name="Rounded Rectangle 43"/>
+          <p:cNvSpPr/>
+          <p:nvPr/>
+        </p:nvSpPr>
+        <p:spPr>
+          <a:xfrm>
+            <a:off x="7704666" y="4504928"/>
+            <a:ext cx="432048" cy="387660"/>
+          </a:xfrm>
+          <a:prstGeom prst="roundRect">
+            <a:avLst/>
+          </a:prstGeom>
+        </p:spPr>
+        <p:style>
+          <a:lnRef idx="1">
+            <a:schemeClr val="accent3"/>
+          </a:lnRef>
+          <a:fillRef idx="3">
+            <a:schemeClr val="accent3"/>
+          </a:fillRef>
+          <a:effectRef idx="2">
+            <a:schemeClr val="accent3"/>
+          </a:effectRef>
+          <a:fontRef idx="minor">
+            <a:schemeClr val="lt1"/>
+          </a:fontRef>
+        </p:style>
+        <p:txBody>
+          <a:bodyPr rtlCol="0" anchor="ctr"/>
+          <a:lstStyle/>
+          <a:p>
+            <a:pPr algn="ctr"/>
+            <a:r>
+              <a:rPr lang="nl-NL" sz="1400" dirty="0" smtClean="0"/>
+              <a:t>T</a:t>
+            </a:r>
+            <a:endParaRPr lang="en-US" sz="1400" dirty="0"/>
+          </a:p>
+        </p:txBody>
+      </p:sp>
+      <p:sp>
+        <p:nvSpPr>
+          <p:cNvPr id="45" name="Flowchart: Direct Access Storage 44"/>
+          <p:cNvSpPr/>
+          <p:nvPr/>
+        </p:nvSpPr>
+        <p:spPr>
+          <a:xfrm>
+            <a:off x="8208722" y="4566368"/>
+            <a:ext cx="288032" cy="360040"/>
+          </a:xfrm>
+          <a:prstGeom prst="flowChartMagneticDrum">
+            <a:avLst/>
+          </a:prstGeom>
+        </p:spPr>
+        <p:style>
+          <a:lnRef idx="2">
+            <a:schemeClr val="accent1">
+              <a:shade val="50000"/>
+            </a:schemeClr>
+          </a:lnRef>
+          <a:fillRef idx="1">
+            <a:schemeClr val="accent1"/>
+          </a:fillRef>
+          <a:effectRef idx="0">
+            <a:schemeClr val="accent1"/>
+          </a:effectRef>
+          <a:fontRef idx="minor">
+            <a:schemeClr val="lt1"/>
+          </a:fontRef>
+        </p:style>
+        <p:txBody>
+          <a:bodyPr rtlCol="0" anchor="ctr"/>
+          <a:lstStyle/>
+          <a:p>
+            <a:pPr algn="ctr"/>
+            <a:endParaRPr lang="en-US"/>
+          </a:p>
+        </p:txBody>
+      </p:sp>
+      <p:cxnSp>
+        <p:nvCxnSpPr>
+          <p:cNvPr id="47" name="Elbow Connector 46"/>
+          <p:cNvCxnSpPr>
+            <a:stCxn id="45" idx="4"/>
+            <a:endCxn id="3" idx="4"/>
+          </p:cNvCxnSpPr>
+          <p:nvPr/>
+        </p:nvCxnSpPr>
+        <p:spPr>
+          <a:xfrm flipH="1" flipV="1">
+            <a:off x="6096382" y="3551021"/>
+            <a:ext cx="2400372" cy="1195367"/>
+          </a:xfrm>
+          <a:prstGeom prst="bentConnector3">
+            <a:avLst>
+              <a:gd name="adj1" fmla="val -9524"/>
+            </a:avLst>
+          </a:prstGeom>
+          <a:ln>
+            <a:tailEnd type="arrow"/>
+          </a:ln>
+        </p:spPr>
+        <p:style>
+          <a:lnRef idx="1">
+            <a:schemeClr val="accent1"/>
+          </a:lnRef>
+          <a:fillRef idx="0">
+            <a:schemeClr val="accent1"/>
+          </a:fillRef>
+          <a:effectRef idx="0">
+            <a:schemeClr val="accent1"/>
+          </a:effectRef>
+          <a:fontRef idx="minor">
+            <a:schemeClr val="tx1"/>
+          </a:fontRef>
+        </p:style>
+      </p:cxnSp>
+      <p:cxnSp>
+        <p:nvCxnSpPr>
+          <p:cNvPr id="49" name="Straight Arrow Connector 48"/>
+          <p:cNvCxnSpPr/>
+          <p:nvPr/>
+        </p:nvCxnSpPr>
+        <p:spPr>
+          <a:xfrm>
+            <a:off x="1043608" y="1991445"/>
+            <a:ext cx="1524382" cy="914126"/>
+          </a:xfrm>
+          <a:prstGeom prst="straightConnector1">
+            <a:avLst/>
+          </a:prstGeom>
+          <a:ln>
+            <a:tailEnd type="arrow"/>
+          </a:ln>
+        </p:spPr>
+        <p:style>
+          <a:lnRef idx="1">
+            <a:schemeClr val="accent1"/>
+          </a:lnRef>
+          <a:fillRef idx="0">
+            <a:schemeClr val="accent1"/>
+          </a:fillRef>
+          <a:effectRef idx="0">
+            <a:schemeClr val="accent1"/>
+          </a:effectRef>
+          <a:fontRef idx="minor">
+            <a:schemeClr val="tx1"/>
+          </a:fontRef>
+        </p:style>
+      </p:cxnSp>
+      <p:sp>
+        <p:nvSpPr>
+          <p:cNvPr id="50" name="Rectangle 49"/>
+          <p:cNvSpPr/>
+          <p:nvPr/>
+        </p:nvSpPr>
+        <p:spPr>
+          <a:xfrm>
+            <a:off x="395536" y="1631405"/>
+            <a:ext cx="1080120" cy="360040"/>
           </a:xfrm>
           <a:prstGeom prst="rect">
             <a:avLst/>
           </a:prstGeom>
-          <a:noFill/>
-          <a:ln>
-            <a:noFill/>
-          </a:ln>
-          <a:extLst>
-            <a:ext uri="{909E8E84-426E-40DD-AFC4-6F175D3DCCD1}">
-              <a14:hiddenFill xmlns:a14="http://schemas.microsoft.com/office/drawing/2010/main">
-                <a:solidFill>
-                  <a:schemeClr val="accent1"/>
-                </a:solidFill>
-              </a14:hiddenFill>
-            </a:ext>
-            <a:ext uri="{91240B29-F687-4F45-9708-019B960494DF}">
-              <a14:hiddenLine xmlns:a14="http://schemas.microsoft.com/office/drawing/2010/main" w="9525">
-                <a:solidFill>
-                  <a:schemeClr val="tx1"/>
-                </a:solidFill>
-                <a:miter lim="800000"/>
-                <a:headEnd/>
-                <a:tailEnd/>
-              </a14:hiddenLine>
-            </a:ext>
-          </a:extLst>
-        </p:spPr>
-      </p:pic>
+        </p:spPr>
+        <p:style>
+          <a:lnRef idx="2">
+            <a:schemeClr val="accent1">
+              <a:shade val="50000"/>
+            </a:schemeClr>
+          </a:lnRef>
+          <a:fillRef idx="1">
+            <a:schemeClr val="accent1"/>
+          </a:fillRef>
+          <a:effectRef idx="0">
+            <a:schemeClr val="accent1"/>
+          </a:effectRef>
+          <a:fontRef idx="minor">
+            <a:schemeClr val="lt1"/>
+          </a:fontRef>
+        </p:style>
+        <p:txBody>
+          <a:bodyPr rtlCol="0" anchor="ctr"/>
+          <a:lstStyle/>
+          <a:p>
+            <a:pPr algn="ctr"/>
+            <a:r>
+              <a:rPr lang="nl-NL" dirty="0" smtClean="0"/>
+              <a:t>SOAP</a:t>
+            </a:r>
+            <a:endParaRPr lang="en-US" dirty="0"/>
+          </a:p>
+        </p:txBody>
+      </p:sp>
+      <p:sp>
+        <p:nvSpPr>
+          <p:cNvPr id="66" name="Cube 65"/>
+          <p:cNvSpPr/>
+          <p:nvPr/>
+        </p:nvSpPr>
+        <p:spPr>
+          <a:xfrm>
+            <a:off x="2594993" y="2731054"/>
+            <a:ext cx="234026" cy="493050"/>
+          </a:xfrm>
+          <a:prstGeom prst="cube">
+            <a:avLst/>
+          </a:prstGeom>
+        </p:spPr>
+        <p:style>
+          <a:lnRef idx="2">
+            <a:schemeClr val="accent1">
+              <a:shade val="50000"/>
+            </a:schemeClr>
+          </a:lnRef>
+          <a:fillRef idx="1">
+            <a:schemeClr val="accent1"/>
+          </a:fillRef>
+          <a:effectRef idx="0">
+            <a:schemeClr val="accent1"/>
+          </a:effectRef>
+          <a:fontRef idx="minor">
+            <a:schemeClr val="lt1"/>
+          </a:fontRef>
+        </p:style>
+        <p:txBody>
+          <a:bodyPr rtlCol="0" anchor="ctr"/>
+          <a:lstStyle/>
+          <a:p>
+            <a:pPr algn="ctr"/>
+            <a:endParaRPr lang="en-US"/>
+          </a:p>
+        </p:txBody>
+      </p:sp>
     </p:spTree>
     <p:extLst>
       <p:ext uri="{BB962C8B-B14F-4D97-AF65-F5344CB8AC3E}">
-        <p14:creationId xmlns:p14="http://schemas.microsoft.com/office/powerpoint/2010/main" val="1985046005"/>
+        <p14:creationId xmlns:p14="http://schemas.microsoft.com/office/powerpoint/2010/main" val="257956599"/>
       </p:ext>
     </p:extLst>
   </p:cSld>
@@ -4360,7 +5513,7 @@
       </p:grpSpPr>
       <p:pic>
         <p:nvPicPr>
-          <p:cNvPr id="2050" name="Picture 2"/>
+          <p:cNvPr id="1026" name="Picture 2"/>
           <p:cNvPicPr>
             <a:picLocks noChangeAspect="1" noChangeArrowheads="1"/>
           </p:cNvPicPr>
@@ -4381,8 +5534,8 @@
         </p:blipFill>
         <p:spPr bwMode="auto">
           <a:xfrm>
-            <a:off x="765175" y="571500"/>
-            <a:ext cx="7613650" cy="5715000"/>
+            <a:off x="660400" y="536575"/>
+            <a:ext cx="7823200" cy="5784850"/>
           </a:xfrm>
           <a:prstGeom prst="rect">
             <a:avLst/>
@@ -4415,7 +5568,7 @@
     </p:spTree>
     <p:extLst>
       <p:ext uri="{BB962C8B-B14F-4D97-AF65-F5344CB8AC3E}">
-        <p14:creationId xmlns:p14="http://schemas.microsoft.com/office/powerpoint/2010/main" val="1905529038"/>
+        <p14:creationId xmlns:p14="http://schemas.microsoft.com/office/powerpoint/2010/main" val="1985046005"/>
       </p:ext>
     </p:extLst>
   </p:cSld>
@@ -4444,7 +5597,7 @@
       </p:grpSpPr>
       <p:pic>
         <p:nvPicPr>
-          <p:cNvPr id="3074" name="Picture 2"/>
+          <p:cNvPr id="2050" name="Picture 2"/>
           <p:cNvPicPr>
             <a:picLocks noChangeAspect="1" noChangeArrowheads="1"/>
           </p:cNvPicPr>
@@ -4465,8 +5618,8 @@
         </p:blipFill>
         <p:spPr bwMode="auto">
           <a:xfrm>
-            <a:off x="720725" y="1219200"/>
-            <a:ext cx="7702550" cy="4419600"/>
+            <a:off x="765175" y="571500"/>
+            <a:ext cx="7613650" cy="5715000"/>
           </a:xfrm>
           <a:prstGeom prst="rect">
             <a:avLst/>
@@ -4499,6 +5652,90 @@
     </p:spTree>
     <p:extLst>
       <p:ext uri="{BB962C8B-B14F-4D97-AF65-F5344CB8AC3E}">
+        <p14:creationId xmlns:p14="http://schemas.microsoft.com/office/powerpoint/2010/main" val="1905529038"/>
+      </p:ext>
+    </p:extLst>
+  </p:cSld>
+  <p:clrMapOvr>
+    <a:masterClrMapping/>
+  </p:clrMapOvr>
+</p:sld>
+</file>
+
+<file path=ppt/slides/slide5.xml><?xml version="1.0" encoding="utf-8"?>
+<p:sld xmlns:a="http://schemas.openxmlformats.org/drawingml/2006/main" xmlns:r="http://schemas.openxmlformats.org/officeDocument/2006/relationships" xmlns:p="http://schemas.openxmlformats.org/presentationml/2006/main">
+  <p:cSld>
+    <p:spTree>
+      <p:nvGrpSpPr>
+        <p:cNvPr id="1" name=""/>
+        <p:cNvGrpSpPr/>
+        <p:nvPr/>
+      </p:nvGrpSpPr>
+      <p:grpSpPr>
+        <a:xfrm>
+          <a:off x="0" y="0"/>
+          <a:ext cx="0" cy="0"/>
+          <a:chOff x="0" y="0"/>
+          <a:chExt cx="0" cy="0"/>
+        </a:xfrm>
+      </p:grpSpPr>
+      <p:pic>
+        <p:nvPicPr>
+          <p:cNvPr id="3074" name="Picture 2"/>
+          <p:cNvPicPr>
+            <a:picLocks noChangeAspect="1" noChangeArrowheads="1"/>
+          </p:cNvPicPr>
+          <p:nvPr/>
+        </p:nvPicPr>
+        <p:blipFill>
+          <a:blip r:embed="rId2">
+            <a:extLst>
+              <a:ext uri="{28A0092B-C50C-407E-A947-70E740481C1C}">
+                <a14:useLocalDpi xmlns:a14="http://schemas.microsoft.com/office/drawing/2010/main" val="0"/>
+              </a:ext>
+            </a:extLst>
+          </a:blip>
+          <a:srcRect/>
+          <a:stretch>
+            <a:fillRect/>
+          </a:stretch>
+        </p:blipFill>
+        <p:spPr bwMode="auto">
+          <a:xfrm>
+            <a:off x="720725" y="1219200"/>
+            <a:ext cx="7702550" cy="4419600"/>
+          </a:xfrm>
+          <a:prstGeom prst="rect">
+            <a:avLst/>
+          </a:prstGeom>
+          <a:noFill/>
+          <a:ln>
+            <a:noFill/>
+          </a:ln>
+          <a:extLst>
+            <a:ext uri="{909E8E84-426E-40DD-AFC4-6F175D3DCCD1}">
+              <a14:hiddenFill xmlns:a14="http://schemas.microsoft.com/office/drawing/2010/main">
+                <a:solidFill>
+                  <a:schemeClr val="accent1"/>
+                </a:solidFill>
+              </a14:hiddenFill>
+            </a:ext>
+            <a:ext uri="{91240B29-F687-4F45-9708-019B960494DF}">
+              <a14:hiddenLine xmlns:a14="http://schemas.microsoft.com/office/drawing/2010/main" w="9525">
+                <a:solidFill>
+                  <a:schemeClr val="tx1"/>
+                </a:solidFill>
+                <a:miter lim="800000"/>
+                <a:headEnd/>
+                <a:tailEnd/>
+              </a14:hiddenLine>
+            </a:ext>
+          </a:extLst>
+        </p:spPr>
+      </p:pic>
+    </p:spTree>
+    <p:extLst>
+      <p:ext uri="{BB962C8B-B14F-4D97-AF65-F5344CB8AC3E}">
         <p14:creationId xmlns:p14="http://schemas.microsoft.com/office/powerpoint/2010/main" val="1087066062"/>
       </p:ext>
     </p:extLst>
@@ -4509,7 +5746,7 @@
 </p:sld>
 </file>
 
-<file path=ppt/slides/slide5.xml><?xml version="1.0" encoding="utf-8"?>
+<file path=ppt/slides/slide6.xml><?xml version="1.0" encoding="utf-8"?>
 <p:sld xmlns:a="http://schemas.openxmlformats.org/drawingml/2006/main" xmlns:r="http://schemas.openxmlformats.org/officeDocument/2006/relationships" xmlns:p="http://schemas.openxmlformats.org/presentationml/2006/main">
   <p:cSld>
     <p:spTree>

</xml_diff>

<commit_message>
Added input parameters in first slide
</commit_message>
<xml_diff>
--- a/ofmw-forum2016-insight-valencia-demo.pptx
+++ b/ofmw-forum2016-insight-valencia-demo.pptx
@@ -4303,6 +4303,111 @@
               <a:t>Engagement</a:t>
             </a:r>
             <a:endParaRPr lang="en-US" sz="1400" dirty="0"/>
+          </a:p>
+        </p:txBody>
+      </p:sp>
+      <p:sp>
+        <p:nvSpPr>
+          <p:cNvPr id="19" name="Rectangle 18"/>
+          <p:cNvSpPr/>
+          <p:nvPr/>
+        </p:nvSpPr>
+        <p:spPr>
+          <a:xfrm>
+            <a:off x="107504" y="1124744"/>
+            <a:ext cx="1080120" cy="792088"/>
+          </a:xfrm>
+          <a:prstGeom prst="rect">
+            <a:avLst/>
+          </a:prstGeom>
+        </p:spPr>
+        <p:style>
+          <a:lnRef idx="1">
+            <a:schemeClr val="dk1"/>
+          </a:lnRef>
+          <a:fillRef idx="2">
+            <a:schemeClr val="dk1"/>
+          </a:fillRef>
+          <a:effectRef idx="1">
+            <a:schemeClr val="dk1"/>
+          </a:effectRef>
+          <a:fontRef idx="minor">
+            <a:schemeClr val="dk1"/>
+          </a:fontRef>
+        </p:style>
+        <p:txBody>
+          <a:bodyPr rtlCol="0" anchor="ctr"/>
+          <a:lstStyle/>
+          <a:p>
+            <a:r>
+              <a:rPr lang="nl-NL" sz="1200" dirty="0" smtClean="0"/>
+              <a:t>Artist</a:t>
+            </a:r>
+          </a:p>
+          <a:p>
+            <a:r>
+              <a:rPr lang="nl-NL" sz="1200" dirty="0" smtClean="0"/>
+              <a:t>Event</a:t>
+            </a:r>
+          </a:p>
+          <a:p>
+            <a:r>
+              <a:rPr lang="nl-NL" sz="1200" dirty="0" smtClean="0"/>
+              <a:t>#</a:t>
+            </a:r>
+            <a:r>
+              <a:rPr lang="nl-NL" sz="1200" dirty="0" err="1" smtClean="0"/>
+              <a:t>votes</a:t>
+            </a:r>
+            <a:endParaRPr lang="nl-NL" sz="1200" dirty="0" smtClean="0"/>
+          </a:p>
+          <a:p>
+            <a:r>
+              <a:rPr lang="nl-NL" sz="1200" dirty="0" err="1" smtClean="0"/>
+              <a:t>motivation</a:t>
+            </a:r>
+            <a:endParaRPr lang="en-US" sz="1200" dirty="0"/>
+          </a:p>
+        </p:txBody>
+      </p:sp>
+      <p:sp>
+        <p:nvSpPr>
+          <p:cNvPr id="20" name="Rectangle 19"/>
+          <p:cNvSpPr/>
+          <p:nvPr/>
+        </p:nvSpPr>
+        <p:spPr>
+          <a:xfrm>
+            <a:off x="3497282" y="402806"/>
+            <a:ext cx="1080120" cy="351656"/>
+          </a:xfrm>
+          <a:prstGeom prst="rect">
+            <a:avLst/>
+          </a:prstGeom>
+        </p:spPr>
+        <p:style>
+          <a:lnRef idx="1">
+            <a:schemeClr val="dk1"/>
+          </a:lnRef>
+          <a:fillRef idx="2">
+            <a:schemeClr val="dk1"/>
+          </a:fillRef>
+          <a:effectRef idx="1">
+            <a:schemeClr val="dk1"/>
+          </a:effectRef>
+          <a:fontRef idx="minor">
+            <a:schemeClr val="dk1"/>
+          </a:fontRef>
+        </p:style>
+        <p:txBody>
+          <a:bodyPr rtlCol="0" anchor="ctr"/>
+          <a:lstStyle/>
+          <a:p>
+            <a:r>
+              <a:rPr lang="nl-NL" sz="1200" dirty="0" err="1" smtClean="0"/>
+              <a:t>ProposalId</a:t>
+            </a:r>
+            <a:endParaRPr lang="en-US" sz="1200" dirty="0"/>
           </a:p>
         </p:txBody>
       </p:sp>

</xml_diff>

<commit_message>
Added more slides to give an impression of the demo
</commit_message>
<xml_diff>
--- a/ofmw-forum2016-insight-valencia-demo.pptx
+++ b/ofmw-forum2016-insight-valencia-demo.pptx
@@ -15,8 +15,10 @@
     <p:sldId id="260" r:id="rId9"/>
     <p:sldId id="268" r:id="rId10"/>
     <p:sldId id="261" r:id="rId11"/>
-    <p:sldId id="258" r:id="rId12"/>
-    <p:sldId id="263" r:id="rId13"/>
+    <p:sldId id="269" r:id="rId12"/>
+    <p:sldId id="270" r:id="rId13"/>
+    <p:sldId id="258" r:id="rId14"/>
+    <p:sldId id="263" r:id="rId15"/>
   </p:sldIdLst>
   <p:sldSz cx="9144000" cy="6858000" type="screen4x3"/>
   <p:notesSz cx="6858000" cy="9144000"/>
@@ -299,7 +301,7 @@
           <a:p>
             <a:fld id="{8A80D3F4-BE92-40ED-BB36-22F03F9BF743}" type="datetimeFigureOut">
               <a:rPr lang="en-US" smtClean="0"/>
-              <a:t>3/12/2016</a:t>
+              <a:t>3/13/2016</a:t>
             </a:fld>
             <a:endParaRPr lang="en-US"/>
           </a:p>
@@ -469,7 +471,7 @@
           <a:p>
             <a:fld id="{8A80D3F4-BE92-40ED-BB36-22F03F9BF743}" type="datetimeFigureOut">
               <a:rPr lang="en-US" smtClean="0"/>
-              <a:t>3/12/2016</a:t>
+              <a:t>3/13/2016</a:t>
             </a:fld>
             <a:endParaRPr lang="en-US"/>
           </a:p>
@@ -649,7 +651,7 @@
           <a:p>
             <a:fld id="{8A80D3F4-BE92-40ED-BB36-22F03F9BF743}" type="datetimeFigureOut">
               <a:rPr lang="en-US" smtClean="0"/>
-              <a:t>3/12/2016</a:t>
+              <a:t>3/13/2016</a:t>
             </a:fld>
             <a:endParaRPr lang="en-US"/>
           </a:p>
@@ -819,7 +821,7 @@
           <a:p>
             <a:fld id="{8A80D3F4-BE92-40ED-BB36-22F03F9BF743}" type="datetimeFigureOut">
               <a:rPr lang="en-US" smtClean="0"/>
-              <a:t>3/12/2016</a:t>
+              <a:t>3/13/2016</a:t>
             </a:fld>
             <a:endParaRPr lang="en-US"/>
           </a:p>
@@ -1065,7 +1067,7 @@
           <a:p>
             <a:fld id="{8A80D3F4-BE92-40ED-BB36-22F03F9BF743}" type="datetimeFigureOut">
               <a:rPr lang="en-US" smtClean="0"/>
-              <a:t>3/12/2016</a:t>
+              <a:t>3/13/2016</a:t>
             </a:fld>
             <a:endParaRPr lang="en-US"/>
           </a:p>
@@ -1353,7 +1355,7 @@
           <a:p>
             <a:fld id="{8A80D3F4-BE92-40ED-BB36-22F03F9BF743}" type="datetimeFigureOut">
               <a:rPr lang="en-US" smtClean="0"/>
-              <a:t>3/12/2016</a:t>
+              <a:t>3/13/2016</a:t>
             </a:fld>
             <a:endParaRPr lang="en-US"/>
           </a:p>
@@ -1775,7 +1777,7 @@
           <a:p>
             <a:fld id="{8A80D3F4-BE92-40ED-BB36-22F03F9BF743}" type="datetimeFigureOut">
               <a:rPr lang="en-US" smtClean="0"/>
-              <a:t>3/12/2016</a:t>
+              <a:t>3/13/2016</a:t>
             </a:fld>
             <a:endParaRPr lang="en-US"/>
           </a:p>
@@ -1893,7 +1895,7 @@
           <a:p>
             <a:fld id="{8A80D3F4-BE92-40ED-BB36-22F03F9BF743}" type="datetimeFigureOut">
               <a:rPr lang="en-US" smtClean="0"/>
-              <a:t>3/12/2016</a:t>
+              <a:t>3/13/2016</a:t>
             </a:fld>
             <a:endParaRPr lang="en-US"/>
           </a:p>
@@ -1988,7 +1990,7 @@
           <a:p>
             <a:fld id="{8A80D3F4-BE92-40ED-BB36-22F03F9BF743}" type="datetimeFigureOut">
               <a:rPr lang="en-US" smtClean="0"/>
-              <a:t>3/12/2016</a:t>
+              <a:t>3/13/2016</a:t>
             </a:fld>
             <a:endParaRPr lang="en-US"/>
           </a:p>
@@ -2265,7 +2267,7 @@
           <a:p>
             <a:fld id="{8A80D3F4-BE92-40ED-BB36-22F03F9BF743}" type="datetimeFigureOut">
               <a:rPr lang="en-US" smtClean="0"/>
-              <a:t>3/12/2016</a:t>
+              <a:t>3/13/2016</a:t>
             </a:fld>
             <a:endParaRPr lang="en-US"/>
           </a:p>
@@ -2518,7 +2520,7 @@
           <a:p>
             <a:fld id="{8A80D3F4-BE92-40ED-BB36-22F03F9BF743}" type="datetimeFigureOut">
               <a:rPr lang="en-US" smtClean="0"/>
-              <a:t>3/12/2016</a:t>
+              <a:t>3/13/2016</a:t>
             </a:fld>
             <a:endParaRPr lang="en-US"/>
           </a:p>
@@ -2731,7 +2733,7 @@
           <a:p>
             <a:fld id="{8A80D3F4-BE92-40ED-BB36-22F03F9BF743}" type="datetimeFigureOut">
               <a:rPr lang="en-US" smtClean="0"/>
-              <a:t>3/12/2016</a:t>
+              <a:t>3/13/2016</a:t>
             </a:fld>
             <a:endParaRPr lang="en-US"/>
           </a:p>
@@ -4599,6 +4601,174 @@
           <a:chExt cx="0" cy="0"/>
         </a:xfrm>
       </p:grpSpPr>
+      <p:pic>
+        <p:nvPicPr>
+          <p:cNvPr id="1026" name="Picture 2"/>
+          <p:cNvPicPr>
+            <a:picLocks noChangeAspect="1" noChangeArrowheads="1"/>
+          </p:cNvPicPr>
+          <p:nvPr/>
+        </p:nvPicPr>
+        <p:blipFill>
+          <a:blip r:embed="rId2">
+            <a:extLst>
+              <a:ext uri="{28A0092B-C50C-407E-A947-70E740481C1C}">
+                <a14:useLocalDpi xmlns:a14="http://schemas.microsoft.com/office/drawing/2010/main" val="0"/>
+              </a:ext>
+            </a:extLst>
+          </a:blip>
+          <a:srcRect/>
+          <a:stretch>
+            <a:fillRect/>
+          </a:stretch>
+        </p:blipFill>
+        <p:spPr bwMode="auto">
+          <a:xfrm>
+            <a:off x="201777" y="1403746"/>
+            <a:ext cx="8912944" cy="4854177"/>
+          </a:xfrm>
+          <a:prstGeom prst="rect">
+            <a:avLst/>
+          </a:prstGeom>
+          <a:noFill/>
+          <a:ln>
+            <a:noFill/>
+          </a:ln>
+          <a:extLst>
+            <a:ext uri="{909E8E84-426E-40DD-AFC4-6F175D3DCCD1}">
+              <a14:hiddenFill xmlns:a14="http://schemas.microsoft.com/office/drawing/2010/main">
+                <a:solidFill>
+                  <a:schemeClr val="accent1"/>
+                </a:solidFill>
+              </a14:hiddenFill>
+            </a:ext>
+            <a:ext uri="{91240B29-F687-4F45-9708-019B960494DF}">
+              <a14:hiddenLine xmlns:a14="http://schemas.microsoft.com/office/drawing/2010/main" w="9525">
+                <a:solidFill>
+                  <a:schemeClr val="tx1"/>
+                </a:solidFill>
+                <a:miter lim="800000"/>
+                <a:headEnd/>
+                <a:tailEnd/>
+              </a14:hiddenLine>
+            </a:ext>
+          </a:extLst>
+        </p:spPr>
+      </p:pic>
+    </p:spTree>
+    <p:extLst>
+      <p:ext uri="{BB962C8B-B14F-4D97-AF65-F5344CB8AC3E}">
+        <p14:creationId xmlns:p14="http://schemas.microsoft.com/office/powerpoint/2010/main" val="1478400"/>
+      </p:ext>
+    </p:extLst>
+  </p:cSld>
+  <p:clrMapOvr>
+    <a:masterClrMapping/>
+  </p:clrMapOvr>
+</p:sld>
+</file>
+
+<file path=ppt/slides/slide12.xml><?xml version="1.0" encoding="utf-8"?>
+<p:sld xmlns:a="http://schemas.openxmlformats.org/drawingml/2006/main" xmlns:r="http://schemas.openxmlformats.org/officeDocument/2006/relationships" xmlns:p="http://schemas.openxmlformats.org/presentationml/2006/main">
+  <p:cSld>
+    <p:spTree>
+      <p:nvGrpSpPr>
+        <p:cNvPr id="1" name=""/>
+        <p:cNvGrpSpPr/>
+        <p:nvPr/>
+      </p:nvGrpSpPr>
+      <p:grpSpPr>
+        <a:xfrm>
+          <a:off x="0" y="0"/>
+          <a:ext cx="0" cy="0"/>
+          <a:chOff x="0" y="0"/>
+          <a:chExt cx="0" cy="0"/>
+        </a:xfrm>
+      </p:grpSpPr>
+      <p:pic>
+        <p:nvPicPr>
+          <p:cNvPr id="2050" name="Picture 2"/>
+          <p:cNvPicPr>
+            <a:picLocks noChangeAspect="1" noChangeArrowheads="1"/>
+          </p:cNvPicPr>
+          <p:nvPr/>
+        </p:nvPicPr>
+        <p:blipFill>
+          <a:blip r:embed="rId2">
+            <a:extLst>
+              <a:ext uri="{28A0092B-C50C-407E-A947-70E740481C1C}">
+                <a14:useLocalDpi xmlns:a14="http://schemas.microsoft.com/office/drawing/2010/main" val="0"/>
+              </a:ext>
+            </a:extLst>
+          </a:blip>
+          <a:srcRect/>
+          <a:stretch>
+            <a:fillRect/>
+          </a:stretch>
+        </p:blipFill>
+        <p:spPr bwMode="auto">
+          <a:xfrm>
+            <a:off x="784225" y="450850"/>
+            <a:ext cx="7575550" cy="5956300"/>
+          </a:xfrm>
+          <a:prstGeom prst="rect">
+            <a:avLst/>
+          </a:prstGeom>
+          <a:noFill/>
+          <a:ln>
+            <a:noFill/>
+          </a:ln>
+          <a:extLst>
+            <a:ext uri="{909E8E84-426E-40DD-AFC4-6F175D3DCCD1}">
+              <a14:hiddenFill xmlns:a14="http://schemas.microsoft.com/office/drawing/2010/main">
+                <a:solidFill>
+                  <a:schemeClr val="accent1"/>
+                </a:solidFill>
+              </a14:hiddenFill>
+            </a:ext>
+            <a:ext uri="{91240B29-F687-4F45-9708-019B960494DF}">
+              <a14:hiddenLine xmlns:a14="http://schemas.microsoft.com/office/drawing/2010/main" w="9525">
+                <a:solidFill>
+                  <a:schemeClr val="tx1"/>
+                </a:solidFill>
+                <a:miter lim="800000"/>
+                <a:headEnd/>
+                <a:tailEnd/>
+              </a14:hiddenLine>
+            </a:ext>
+          </a:extLst>
+        </p:spPr>
+      </p:pic>
+    </p:spTree>
+    <p:extLst>
+      <p:ext uri="{BB962C8B-B14F-4D97-AF65-F5344CB8AC3E}">
+        <p14:creationId xmlns:p14="http://schemas.microsoft.com/office/powerpoint/2010/main" val="4247231198"/>
+      </p:ext>
+    </p:extLst>
+  </p:cSld>
+  <p:clrMapOvr>
+    <a:masterClrMapping/>
+  </p:clrMapOvr>
+</p:sld>
+</file>
+
+<file path=ppt/slides/slide13.xml><?xml version="1.0" encoding="utf-8"?>
+<p:sld xmlns:a="http://schemas.openxmlformats.org/drawingml/2006/main" xmlns:r="http://schemas.openxmlformats.org/officeDocument/2006/relationships" xmlns:p="http://schemas.openxmlformats.org/presentationml/2006/main">
+  <p:cSld>
+    <p:spTree>
+      <p:nvGrpSpPr>
+        <p:cNvPr id="1" name=""/>
+        <p:cNvGrpSpPr/>
+        <p:nvPr/>
+      </p:nvGrpSpPr>
+      <p:grpSpPr>
+        <a:xfrm>
+          <a:off x="0" y="0"/>
+          <a:ext cx="0" cy="0"/>
+          <a:chOff x="0" y="0"/>
+          <a:chExt cx="0" cy="0"/>
+        </a:xfrm>
+      </p:grpSpPr>
       <p:sp>
         <p:nvSpPr>
           <p:cNvPr id="2" name="Rounded Rectangle 1"/>
@@ -6139,7 +6309,7 @@
 </p:sld>
 </file>
 
-<file path=ppt/slides/slide12.xml><?xml version="1.0" encoding="utf-8"?>
+<file path=ppt/slides/slide14.xml><?xml version="1.0" encoding="utf-8"?>
 <p:sld xmlns:a="http://schemas.openxmlformats.org/drawingml/2006/main" xmlns:r="http://schemas.openxmlformats.org/officeDocument/2006/relationships" xmlns:p="http://schemas.openxmlformats.org/presentationml/2006/main">
   <p:cSld>
     <p:spTree>
@@ -8375,7 +8545,7 @@
         </p:blipFill>
         <p:spPr bwMode="auto">
           <a:xfrm>
-            <a:off x="395536" y="1916832"/>
+            <a:off x="107504" y="2889922"/>
             <a:ext cx="4102596" cy="1115142"/>
           </a:xfrm>
           <a:prstGeom prst="rect">
@@ -8429,7 +8599,7 @@
         </p:blipFill>
         <p:spPr bwMode="auto">
           <a:xfrm>
-            <a:off x="3779912" y="116632"/>
+            <a:off x="4303133" y="116632"/>
             <a:ext cx="4733363" cy="2149723"/>
           </a:xfrm>
           <a:prstGeom prst="rect">
@@ -8483,8 +8653,8 @@
         </p:blipFill>
         <p:spPr bwMode="auto">
           <a:xfrm>
-            <a:off x="4075066" y="3893623"/>
-            <a:ext cx="5007149" cy="1820304"/>
+            <a:off x="4355976" y="4879170"/>
+            <a:ext cx="4726239" cy="1718182"/>
           </a:xfrm>
           <a:prstGeom prst="rect">
             <a:avLst/>
@@ -8537,8 +8707,8 @@
         </p:blipFill>
         <p:spPr bwMode="auto">
           <a:xfrm>
-            <a:off x="-30038" y="3178524"/>
-            <a:ext cx="4528170" cy="1250876"/>
+            <a:off x="107504" y="3789040"/>
+            <a:ext cx="4102596" cy="1133314"/>
           </a:xfrm>
           <a:prstGeom prst="rect">
             <a:avLst/>
@@ -8576,7 +8746,7 @@
         </p:nvSpPr>
         <p:spPr>
           <a:xfrm>
-            <a:off x="1979712" y="4005064"/>
+            <a:off x="1714113" y="4622838"/>
             <a:ext cx="1357348" cy="291745"/>
           </a:xfrm>
           <a:prstGeom prst="roundRect">
@@ -8618,7 +8788,7 @@
         </p:nvSpPr>
         <p:spPr>
           <a:xfrm>
-            <a:off x="4789245" y="1547180"/>
+            <a:off x="5312466" y="1547180"/>
             <a:ext cx="1357348" cy="291745"/>
           </a:xfrm>
           <a:prstGeom prst="roundRect">
@@ -8660,7 +8830,7 @@
         </p:nvSpPr>
         <p:spPr>
           <a:xfrm>
-            <a:off x="4789245" y="1916832"/>
+            <a:off x="5312466" y="1916832"/>
             <a:ext cx="1357348" cy="291745"/>
           </a:xfrm>
           <a:prstGeom prst="roundRect">
@@ -8702,7 +8872,7 @@
         </p:nvSpPr>
         <p:spPr>
           <a:xfrm>
-            <a:off x="4555592" y="5117878"/>
+            <a:off x="4555592" y="6124986"/>
             <a:ext cx="1558030" cy="291745"/>
           </a:xfrm>
           <a:prstGeom prst="roundRect">
@@ -8744,7 +8914,7 @@
         </p:nvSpPr>
         <p:spPr>
           <a:xfrm>
-            <a:off x="4555592" y="5442515"/>
+            <a:off x="4555592" y="6449623"/>
             <a:ext cx="1558030" cy="291745"/>
           </a:xfrm>
           <a:prstGeom prst="roundRect">
@@ -8786,7 +8956,7 @@
         </p:nvSpPr>
         <p:spPr>
           <a:xfrm>
-            <a:off x="3779912" y="765464"/>
+            <a:off x="4303133" y="765464"/>
             <a:ext cx="1357348" cy="291745"/>
           </a:xfrm>
           <a:prstGeom prst="roundRect">
@@ -8832,7 +9002,7 @@
         </p:nvSpPr>
         <p:spPr>
           <a:xfrm>
-            <a:off x="4789245" y="2342805"/>
+            <a:off x="5312466" y="2342805"/>
             <a:ext cx="1558030" cy="291745"/>
           </a:xfrm>
           <a:prstGeom prst="roundRect">
@@ -8870,6 +9040,157 @@
           </a:p>
         </p:txBody>
       </p:sp>
+      <p:sp>
+        <p:nvSpPr>
+          <p:cNvPr id="13" name="Flowchart: Magnetic Disk 12"/>
+          <p:cNvSpPr/>
+          <p:nvPr/>
+        </p:nvSpPr>
+        <p:spPr>
+          <a:xfrm>
+            <a:off x="4921996" y="3356992"/>
+            <a:ext cx="1152128" cy="1152128"/>
+          </a:xfrm>
+          <a:prstGeom prst="flowChartMagneticDisk">
+            <a:avLst/>
+          </a:prstGeom>
+        </p:spPr>
+        <p:style>
+          <a:lnRef idx="1">
+            <a:schemeClr val="accent2"/>
+          </a:lnRef>
+          <a:fillRef idx="2">
+            <a:schemeClr val="accent2"/>
+          </a:fillRef>
+          <a:effectRef idx="1">
+            <a:schemeClr val="accent2"/>
+          </a:effectRef>
+          <a:fontRef idx="minor">
+            <a:schemeClr val="dk1"/>
+          </a:fontRef>
+        </p:style>
+        <p:txBody>
+          <a:bodyPr rtlCol="0" anchor="ctr"/>
+          <a:lstStyle/>
+          <a:p>
+            <a:pPr algn="ctr"/>
+            <a:endParaRPr lang="en-US"/>
+          </a:p>
+        </p:txBody>
+      </p:sp>
+      <p:cxnSp>
+        <p:nvCxnSpPr>
+          <p:cNvPr id="3" name="Elbow Connector 2"/>
+          <p:cNvCxnSpPr>
+            <a:stCxn id="13" idx="1"/>
+            <a:endCxn id="1027" idx="1"/>
+          </p:cNvCxnSpPr>
+          <p:nvPr/>
+        </p:nvCxnSpPr>
+        <p:spPr>
+          <a:xfrm rot="16200000" flipV="1">
+            <a:off x="3817848" y="1676779"/>
+            <a:ext cx="2165498" cy="1194927"/>
+          </a:xfrm>
+          <a:prstGeom prst="bentConnector4">
+            <a:avLst>
+              <a:gd name="adj1" fmla="val 29523"/>
+              <a:gd name="adj2" fmla="val 119131"/>
+            </a:avLst>
+          </a:prstGeom>
+          <a:ln>
+            <a:tailEnd type="arrow"/>
+          </a:ln>
+        </p:spPr>
+        <p:style>
+          <a:lnRef idx="1">
+            <a:schemeClr val="accent1"/>
+          </a:lnRef>
+          <a:fillRef idx="0">
+            <a:schemeClr val="accent1"/>
+          </a:fillRef>
+          <a:effectRef idx="0">
+            <a:schemeClr val="accent1"/>
+          </a:effectRef>
+          <a:fontRef idx="minor">
+            <a:schemeClr val="tx1"/>
+          </a:fontRef>
+        </p:style>
+      </p:cxnSp>
+      <p:cxnSp>
+        <p:nvCxnSpPr>
+          <p:cNvPr id="14" name="Elbow Connector 13"/>
+          <p:cNvCxnSpPr>
+            <a:endCxn id="13" idx="2"/>
+          </p:cNvCxnSpPr>
+          <p:nvPr/>
+        </p:nvCxnSpPr>
+        <p:spPr>
+          <a:xfrm>
+            <a:off x="3923928" y="3645024"/>
+            <a:ext cx="998068" cy="288032"/>
+          </a:xfrm>
+          <a:prstGeom prst="bentConnector3">
+            <a:avLst/>
+          </a:prstGeom>
+          <a:ln>
+            <a:tailEnd type="arrow"/>
+          </a:ln>
+        </p:spPr>
+        <p:style>
+          <a:lnRef idx="1">
+            <a:schemeClr val="accent1"/>
+          </a:lnRef>
+          <a:fillRef idx="0">
+            <a:schemeClr val="accent1"/>
+          </a:fillRef>
+          <a:effectRef idx="0">
+            <a:schemeClr val="accent1"/>
+          </a:effectRef>
+          <a:fontRef idx="minor">
+            <a:schemeClr val="tx1"/>
+          </a:fontRef>
+        </p:style>
+      </p:cxnSp>
+      <p:cxnSp>
+        <p:nvCxnSpPr>
+          <p:cNvPr id="16" name="Elbow Connector 15"/>
+          <p:cNvCxnSpPr>
+            <a:stCxn id="13" idx="3"/>
+            <a:endCxn id="1028" idx="1"/>
+          </p:cNvCxnSpPr>
+          <p:nvPr/>
+        </p:nvCxnSpPr>
+        <p:spPr>
+          <a:xfrm rot="5400000">
+            <a:off x="4312448" y="4552648"/>
+            <a:ext cx="1229141" cy="1142084"/>
+          </a:xfrm>
+          <a:prstGeom prst="bentConnector4">
+            <a:avLst>
+              <a:gd name="adj1" fmla="val 64417"/>
+              <a:gd name="adj2" fmla="val 120016"/>
+            </a:avLst>
+          </a:prstGeom>
+          <a:ln>
+            <a:tailEnd type="arrow"/>
+          </a:ln>
+        </p:spPr>
+        <p:style>
+          <a:lnRef idx="1">
+            <a:schemeClr val="accent1"/>
+          </a:lnRef>
+          <a:fillRef idx="0">
+            <a:schemeClr val="accent1"/>
+          </a:fillRef>
+          <a:effectRef idx="0">
+            <a:schemeClr val="accent1"/>
+          </a:effectRef>
+          <a:fontRef idx="minor">
+            <a:schemeClr val="tx1"/>
+          </a:fontRef>
+        </p:style>
+      </p:cxnSp>
     </p:spTree>
     <p:extLst>
       <p:ext uri="{BB962C8B-B14F-4D97-AF65-F5344CB8AC3E}">

</xml_diff>

<commit_message>
Lots of changes, exports etc.
</commit_message>
<xml_diff>
--- a/ofmw-forum2016-insight-valencia-demo.pptx
+++ b/ofmw-forum2016-insight-valencia-demo.pptx
@@ -301,7 +301,7 @@
           <a:p>
             <a:fld id="{8A80D3F4-BE92-40ED-BB36-22F03F9BF743}" type="datetimeFigureOut">
               <a:rPr lang="en-US" smtClean="0"/>
-              <a:t>3/13/2016</a:t>
+              <a:t>3/15/2016</a:t>
             </a:fld>
             <a:endParaRPr lang="en-US"/>
           </a:p>
@@ -471,7 +471,7 @@
           <a:p>
             <a:fld id="{8A80D3F4-BE92-40ED-BB36-22F03F9BF743}" type="datetimeFigureOut">
               <a:rPr lang="en-US" smtClean="0"/>
-              <a:t>3/13/2016</a:t>
+              <a:t>3/15/2016</a:t>
             </a:fld>
             <a:endParaRPr lang="en-US"/>
           </a:p>
@@ -651,7 +651,7 @@
           <a:p>
             <a:fld id="{8A80D3F4-BE92-40ED-BB36-22F03F9BF743}" type="datetimeFigureOut">
               <a:rPr lang="en-US" smtClean="0"/>
-              <a:t>3/13/2016</a:t>
+              <a:t>3/15/2016</a:t>
             </a:fld>
             <a:endParaRPr lang="en-US"/>
           </a:p>
@@ -821,7 +821,7 @@
           <a:p>
             <a:fld id="{8A80D3F4-BE92-40ED-BB36-22F03F9BF743}" type="datetimeFigureOut">
               <a:rPr lang="en-US" smtClean="0"/>
-              <a:t>3/13/2016</a:t>
+              <a:t>3/15/2016</a:t>
             </a:fld>
             <a:endParaRPr lang="en-US"/>
           </a:p>
@@ -1067,7 +1067,7 @@
           <a:p>
             <a:fld id="{8A80D3F4-BE92-40ED-BB36-22F03F9BF743}" type="datetimeFigureOut">
               <a:rPr lang="en-US" smtClean="0"/>
-              <a:t>3/13/2016</a:t>
+              <a:t>3/15/2016</a:t>
             </a:fld>
             <a:endParaRPr lang="en-US"/>
           </a:p>
@@ -1355,7 +1355,7 @@
           <a:p>
             <a:fld id="{8A80D3F4-BE92-40ED-BB36-22F03F9BF743}" type="datetimeFigureOut">
               <a:rPr lang="en-US" smtClean="0"/>
-              <a:t>3/13/2016</a:t>
+              <a:t>3/15/2016</a:t>
             </a:fld>
             <a:endParaRPr lang="en-US"/>
           </a:p>
@@ -1777,7 +1777,7 @@
           <a:p>
             <a:fld id="{8A80D3F4-BE92-40ED-BB36-22F03F9BF743}" type="datetimeFigureOut">
               <a:rPr lang="en-US" smtClean="0"/>
-              <a:t>3/13/2016</a:t>
+              <a:t>3/15/2016</a:t>
             </a:fld>
             <a:endParaRPr lang="en-US"/>
           </a:p>
@@ -1895,7 +1895,7 @@
           <a:p>
             <a:fld id="{8A80D3F4-BE92-40ED-BB36-22F03F9BF743}" type="datetimeFigureOut">
               <a:rPr lang="en-US" smtClean="0"/>
-              <a:t>3/13/2016</a:t>
+              <a:t>3/15/2016</a:t>
             </a:fld>
             <a:endParaRPr lang="en-US"/>
           </a:p>
@@ -1990,7 +1990,7 @@
           <a:p>
             <a:fld id="{8A80D3F4-BE92-40ED-BB36-22F03F9BF743}" type="datetimeFigureOut">
               <a:rPr lang="en-US" smtClean="0"/>
-              <a:t>3/13/2016</a:t>
+              <a:t>3/15/2016</a:t>
             </a:fld>
             <a:endParaRPr lang="en-US"/>
           </a:p>
@@ -2267,7 +2267,7 @@
           <a:p>
             <a:fld id="{8A80D3F4-BE92-40ED-BB36-22F03F9BF743}" type="datetimeFigureOut">
               <a:rPr lang="en-US" smtClean="0"/>
-              <a:t>3/13/2016</a:t>
+              <a:t>3/15/2016</a:t>
             </a:fld>
             <a:endParaRPr lang="en-US"/>
           </a:p>
@@ -2520,7 +2520,7 @@
           <a:p>
             <a:fld id="{8A80D3F4-BE92-40ED-BB36-22F03F9BF743}" type="datetimeFigureOut">
               <a:rPr lang="en-US" smtClean="0"/>
-              <a:t>3/13/2016</a:t>
+              <a:t>3/15/2016</a:t>
             </a:fld>
             <a:endParaRPr lang="en-US"/>
           </a:p>
@@ -2733,7 +2733,7 @@
           <a:p>
             <a:fld id="{8A80D3F4-BE92-40ED-BB36-22F03F9BF743}" type="datetimeFigureOut">
               <a:rPr lang="en-US" smtClean="0"/>
-              <a:t>3/13/2016</a:t>
+              <a:t>3/15/2016</a:t>
             </a:fld>
             <a:endParaRPr lang="en-US"/>
           </a:p>
@@ -7012,11 +7012,7 @@
             <a:pPr algn="ctr"/>
             <a:r>
               <a:rPr lang="nl-NL" dirty="0" smtClean="0"/>
-              <a:t>SOA </a:t>
-            </a:r>
-            <a:r>
-              <a:rPr lang="nl-NL" dirty="0" err="1" smtClean="0"/>
-              <a:t>Composite</a:t>
+              <a:t>Service Bus</a:t>
             </a:r>
             <a:endParaRPr lang="nl-NL" dirty="0" smtClean="0"/>
           </a:p>
@@ -7574,16 +7570,16 @@
         </p:spPr>
         <p:style>
           <a:lnRef idx="1">
-            <a:schemeClr val="accent4"/>
-          </a:lnRef>
-          <a:fillRef idx="2">
-            <a:schemeClr val="accent4"/>
-          </a:fillRef>
-          <a:effectRef idx="1">
-            <a:schemeClr val="accent4"/>
-          </a:effectRef>
-          <a:fontRef idx="minor">
-            <a:schemeClr val="dk1"/>
+            <a:schemeClr val="accent3"/>
+          </a:lnRef>
+          <a:fillRef idx="3">
+            <a:schemeClr val="accent3"/>
+          </a:fillRef>
+          <a:effectRef idx="2">
+            <a:schemeClr val="accent3"/>
+          </a:effectRef>
+          <a:fontRef idx="minor">
+            <a:schemeClr val="lt1"/>
           </a:fontRef>
         </p:style>
         <p:txBody>
@@ -7592,10 +7588,17 @@
           <a:p>
             <a:pPr algn="ctr"/>
             <a:r>
-              <a:rPr lang="nl-NL" dirty="0" smtClean="0"/>
-              <a:t>M</a:t>
-            </a:r>
-            <a:endParaRPr lang="en-US" dirty="0"/>
+              <a:rPr lang="nl-NL" sz="1400" dirty="0" smtClean="0"/>
+              <a:t>Pipe</a:t>
+            </a:r>
+          </a:p>
+          <a:p>
+            <a:pPr algn="ctr"/>
+            <a:r>
+              <a:rPr lang="nl-NL" sz="1400" dirty="0" smtClean="0"/>
+              <a:t>line</a:t>
+            </a:r>
+            <a:endParaRPr lang="en-US" sz="1400" dirty="0"/>
           </a:p>
         </p:txBody>
       </p:sp>
@@ -8073,7 +8076,7 @@
             <a:pPr algn="ctr"/>
             <a:r>
               <a:rPr lang="nl-NL" dirty="0" smtClean="0"/>
-              <a:t>SOAP</a:t>
+              <a:t>REST</a:t>
             </a:r>
             <a:endParaRPr lang="en-US" dirty="0"/>
           </a:p>

</xml_diff>